<commit_message>
Eliminated tif pictures. Modified figure for AROC.
</commit_message>
<xml_diff>
--- a/Manuscript/Figures/04_Results_AROC_AROCz.pptx
+++ b/Manuscript/Figures/04_Results_AROC_AROCz.pptx
@@ -2,12 +2,12 @@
 <file path=ppt/presentation.xml><?xml version="1.0" encoding="utf-8"?>
 <p:presentation xmlns:a="http://schemas.openxmlformats.org/drawingml/2006/main" xmlns:r="http://schemas.openxmlformats.org/officeDocument/2006/relationships" xmlns:p="http://schemas.openxmlformats.org/presentationml/2006/main" saveSubsetFonts="1">
   <p:sldMasterIdLst>
-    <p:sldMasterId id="2147483672" r:id="rId1"/>
+    <p:sldMasterId id="2147483684" r:id="rId1"/>
   </p:sldMasterIdLst>
   <p:sldIdLst>
-    <p:sldId id="256" r:id="rId2"/>
+    <p:sldId id="257" r:id="rId2"/>
   </p:sldIdLst>
-  <p:sldSz cx="6858000" cy="5994400"/>
+  <p:sldSz cx="6551613" cy="5994400"/>
   <p:notesSz cx="6858000" cy="9144000"/>
   <p:defaultTextStyle>
     <a:defPPr>
@@ -104,7 +104,136 @@
       </a:defRPr>
     </a:lvl9pPr>
   </p:defaultTextStyle>
+  <p:extLst>
+    <p:ext uri="{EFAFB233-063F-42B5-8137-9DF3F51BA10A}">
+      <p15:sldGuideLst xmlns:p15="http://schemas.microsoft.com/office/powerpoint/2012/main"/>
+    </p:ext>
+  </p:extLst>
 </p:presentation>
+</file>
+
+<file path=ppt/revisionInfo.xml><?xml version="1.0" encoding="utf-8"?>
+<p1510:revInfo xmlns:a="http://schemas.openxmlformats.org/drawingml/2006/main" xmlns:r="http://schemas.openxmlformats.org/officeDocument/2006/relationships" xmlns:p1510="http://schemas.microsoft.com/office/powerpoint/2015/10/main">
+  <p1510:revLst>
+    <p1510:client id="{DC98660D-F6E1-4194-B211-8B1AB1E2933D}" v="3" dt="2023-09-12T17:03:44.340"/>
+  </p1510:revLst>
+</p1510:revInfo>
+</file>
+
+<file path=ppt/changesInfos/changesInfo1.xml><?xml version="1.0" encoding="utf-8"?>
+<pc:chgInfo xmlns:a="http://schemas.openxmlformats.org/drawingml/2006/main" xmlns:r="http://schemas.openxmlformats.org/officeDocument/2006/relationships" xmlns:ac="http://schemas.microsoft.com/office/drawing/2013/main/command" xmlns:pc="http://schemas.microsoft.com/office/powerpoint/2013/main/command">
+  <pc:docChgLst>
+    <pc:chgData name="Fatima Maria Pillosu" userId="ff035341-0897-461c-8a78-f8f5d53ad921" providerId="ADAL" clId="{DC98660D-F6E1-4194-B211-8B1AB1E2933D}"/>
+    <pc:docChg chg="custSel addSld delSld modSld">
+      <pc:chgData name="Fatima Maria Pillosu" userId="ff035341-0897-461c-8a78-f8f5d53ad921" providerId="ADAL" clId="{DC98660D-F6E1-4194-B211-8B1AB1E2933D}" dt="2023-09-12T17:03:44.340" v="103"/>
+      <pc:docMkLst>
+        <pc:docMk/>
+      </pc:docMkLst>
+      <pc:sldChg chg="del">
+        <pc:chgData name="Fatima Maria Pillosu" userId="ff035341-0897-461c-8a78-f8f5d53ad921" providerId="ADAL" clId="{DC98660D-F6E1-4194-B211-8B1AB1E2933D}" dt="2023-09-12T17:02:57.501" v="74" actId="2696"/>
+        <pc:sldMkLst>
+          <pc:docMk/>
+          <pc:sldMk cId="3018267397" sldId="256"/>
+        </pc:sldMkLst>
+      </pc:sldChg>
+      <pc:sldChg chg="addSp delSp modSp new mod">
+        <pc:chgData name="Fatima Maria Pillosu" userId="ff035341-0897-461c-8a78-f8f5d53ad921" providerId="ADAL" clId="{DC98660D-F6E1-4194-B211-8B1AB1E2933D}" dt="2023-09-12T17:03:44.340" v="103"/>
+        <pc:sldMkLst>
+          <pc:docMk/>
+          <pc:sldMk cId="1020928249" sldId="257"/>
+        </pc:sldMkLst>
+        <pc:spChg chg="del">
+          <ac:chgData name="Fatima Maria Pillosu" userId="ff035341-0897-461c-8a78-f8f5d53ad921" providerId="ADAL" clId="{DC98660D-F6E1-4194-B211-8B1AB1E2933D}" dt="2023-09-12T16:59:24.014" v="1" actId="478"/>
+          <ac:spMkLst>
+            <pc:docMk/>
+            <pc:sldMk cId="1020928249" sldId="257"/>
+            <ac:spMk id="2" creationId="{6A77B12A-1847-6D65-1C78-A1F9170D4F6E}"/>
+          </ac:spMkLst>
+        </pc:spChg>
+        <pc:spChg chg="del">
+          <ac:chgData name="Fatima Maria Pillosu" userId="ff035341-0897-461c-8a78-f8f5d53ad921" providerId="ADAL" clId="{DC98660D-F6E1-4194-B211-8B1AB1E2933D}" dt="2023-09-12T16:59:25.585" v="2" actId="478"/>
+          <ac:spMkLst>
+            <pc:docMk/>
+            <pc:sldMk cId="1020928249" sldId="257"/>
+            <ac:spMk id="3" creationId="{4D3C3052-E040-DD5E-8CC0-B5906E50C2CF}"/>
+          </ac:spMkLst>
+        </pc:spChg>
+        <pc:spChg chg="add del">
+          <ac:chgData name="Fatima Maria Pillosu" userId="ff035341-0897-461c-8a78-f8f5d53ad921" providerId="ADAL" clId="{DC98660D-F6E1-4194-B211-8B1AB1E2933D}" dt="2023-09-12T17:03:27.958" v="101" actId="478"/>
+          <ac:spMkLst>
+            <pc:docMk/>
+            <pc:sldMk cId="1020928249" sldId="257"/>
+            <ac:spMk id="12" creationId="{A0B96EF3-77D8-A99F-2BA9-212EE2E440F8}"/>
+          </ac:spMkLst>
+        </pc:spChg>
+        <pc:picChg chg="add del mod modCrop">
+          <ac:chgData name="Fatima Maria Pillosu" userId="ff035341-0897-461c-8a78-f8f5d53ad921" providerId="ADAL" clId="{DC98660D-F6E1-4194-B211-8B1AB1E2933D}" dt="2023-09-12T17:03:29.476" v="102" actId="21"/>
+          <ac:picMkLst>
+            <pc:docMk/>
+            <pc:sldMk cId="1020928249" sldId="257"/>
+            <ac:picMk id="5" creationId="{C6BA5668-ABDB-345D-92D4-35EF6A82469C}"/>
+          </ac:picMkLst>
+        </pc:picChg>
+        <pc:picChg chg="add del mod modCrop">
+          <ac:chgData name="Fatima Maria Pillosu" userId="ff035341-0897-461c-8a78-f8f5d53ad921" providerId="ADAL" clId="{DC98660D-F6E1-4194-B211-8B1AB1E2933D}" dt="2023-09-12T17:03:29.476" v="102" actId="21"/>
+          <ac:picMkLst>
+            <pc:docMk/>
+            <pc:sldMk cId="1020928249" sldId="257"/>
+            <ac:picMk id="7" creationId="{42DF7DDF-3510-27EF-7EEC-78F1893303E2}"/>
+          </ac:picMkLst>
+        </pc:picChg>
+        <pc:picChg chg="add del mod modCrop">
+          <ac:chgData name="Fatima Maria Pillosu" userId="ff035341-0897-461c-8a78-f8f5d53ad921" providerId="ADAL" clId="{DC98660D-F6E1-4194-B211-8B1AB1E2933D}" dt="2023-09-12T17:03:29.476" v="102" actId="21"/>
+          <ac:picMkLst>
+            <pc:docMk/>
+            <pc:sldMk cId="1020928249" sldId="257"/>
+            <ac:picMk id="9" creationId="{CB6E45C2-0AE2-AFE9-EFC3-18EA4B844DD3}"/>
+          </ac:picMkLst>
+        </pc:picChg>
+        <pc:picChg chg="add del mod modCrop">
+          <ac:chgData name="Fatima Maria Pillosu" userId="ff035341-0897-461c-8a78-f8f5d53ad921" providerId="ADAL" clId="{DC98660D-F6E1-4194-B211-8B1AB1E2933D}" dt="2023-09-12T17:03:29.476" v="102" actId="21"/>
+          <ac:picMkLst>
+            <pc:docMk/>
+            <pc:sldMk cId="1020928249" sldId="257"/>
+            <ac:picMk id="11" creationId="{B025A3EB-440C-6AD8-B5F7-5B75B4881E59}"/>
+          </ac:picMkLst>
+        </pc:picChg>
+        <pc:picChg chg="add mod">
+          <ac:chgData name="Fatima Maria Pillosu" userId="ff035341-0897-461c-8a78-f8f5d53ad921" providerId="ADAL" clId="{DC98660D-F6E1-4194-B211-8B1AB1E2933D}" dt="2023-09-12T17:03:44.340" v="103"/>
+          <ac:picMkLst>
+            <pc:docMk/>
+            <pc:sldMk cId="1020928249" sldId="257"/>
+            <ac:picMk id="13" creationId="{96717325-C6C3-30D6-398C-0D533D635D41}"/>
+          </ac:picMkLst>
+        </pc:picChg>
+        <pc:picChg chg="add mod">
+          <ac:chgData name="Fatima Maria Pillosu" userId="ff035341-0897-461c-8a78-f8f5d53ad921" providerId="ADAL" clId="{DC98660D-F6E1-4194-B211-8B1AB1E2933D}" dt="2023-09-12T17:03:44.340" v="103"/>
+          <ac:picMkLst>
+            <pc:docMk/>
+            <pc:sldMk cId="1020928249" sldId="257"/>
+            <ac:picMk id="14" creationId="{AD73AE78-0E11-8170-49DB-A643BF1FC229}"/>
+          </ac:picMkLst>
+        </pc:picChg>
+        <pc:picChg chg="add mod">
+          <ac:chgData name="Fatima Maria Pillosu" userId="ff035341-0897-461c-8a78-f8f5d53ad921" providerId="ADAL" clId="{DC98660D-F6E1-4194-B211-8B1AB1E2933D}" dt="2023-09-12T17:03:44.340" v="103"/>
+          <ac:picMkLst>
+            <pc:docMk/>
+            <pc:sldMk cId="1020928249" sldId="257"/>
+            <ac:picMk id="15" creationId="{DDE7059B-CB3E-B84E-925C-6D1827ED6B30}"/>
+          </ac:picMkLst>
+        </pc:picChg>
+        <pc:picChg chg="add mod">
+          <ac:chgData name="Fatima Maria Pillosu" userId="ff035341-0897-461c-8a78-f8f5d53ad921" providerId="ADAL" clId="{DC98660D-F6E1-4194-B211-8B1AB1E2933D}" dt="2023-09-12T17:03:44.340" v="103"/>
+          <ac:picMkLst>
+            <pc:docMk/>
+            <pc:sldMk cId="1020928249" sldId="257"/>
+            <ac:picMk id="16" creationId="{2BA1BDC2-D55B-B980-D056-1C6D72928FF7}"/>
+          </ac:picMkLst>
+        </pc:picChg>
+      </pc:sldChg>
+    </pc:docChg>
+  </pc:docChgLst>
+</pc:chgInfo>
 </file>
 
 <file path=ppt/slideLayouts/slideLayout1.xml><?xml version="1.0" encoding="utf-8"?>
@@ -136,15 +265,15 @@
         </p:nvSpPr>
         <p:spPr>
           <a:xfrm>
-            <a:off x="514350" y="981029"/>
-            <a:ext cx="5829300" cy="2086939"/>
+            <a:off x="491371" y="981029"/>
+            <a:ext cx="5568871" cy="2086939"/>
           </a:xfrm>
         </p:spPr>
         <p:txBody>
           <a:bodyPr anchor="b"/>
           <a:lstStyle>
             <a:lvl1pPr algn="ctr">
-              <a:defRPr sz="4500"/>
+              <a:defRPr sz="4299"/>
             </a:lvl1pPr>
           </a:lstStyle>
           <a:p>
@@ -168,8 +297,8 @@
         </p:nvSpPr>
         <p:spPr>
           <a:xfrm>
-            <a:off x="857250" y="3148448"/>
-            <a:ext cx="5143500" cy="1447259"/>
+            <a:off x="818952" y="3148448"/>
+            <a:ext cx="4913710" cy="1447259"/>
           </a:xfrm>
         </p:spPr>
         <p:txBody>
@@ -177,39 +306,39 @@
           <a:lstStyle>
             <a:lvl1pPr marL="0" indent="0" algn="ctr">
               <a:buNone/>
-              <a:defRPr sz="1800"/>
+              <a:defRPr sz="1720"/>
             </a:lvl1pPr>
-            <a:lvl2pPr marL="342900" indent="0" algn="ctr">
-              <a:buNone/>
-              <a:defRPr sz="1500"/>
+            <a:lvl2pPr marL="327584" indent="0" algn="ctr">
+              <a:buNone/>
+              <a:defRPr sz="1433"/>
             </a:lvl2pPr>
-            <a:lvl3pPr marL="685800" indent="0" algn="ctr">
-              <a:buNone/>
-              <a:defRPr sz="1350"/>
+            <a:lvl3pPr marL="655168" indent="0" algn="ctr">
+              <a:buNone/>
+              <a:defRPr sz="1290"/>
             </a:lvl3pPr>
-            <a:lvl4pPr marL="1028700" indent="0" algn="ctr">
-              <a:buNone/>
-              <a:defRPr sz="1200"/>
+            <a:lvl4pPr marL="982751" indent="0" algn="ctr">
+              <a:buNone/>
+              <a:defRPr sz="1146"/>
             </a:lvl4pPr>
-            <a:lvl5pPr marL="1371600" indent="0" algn="ctr">
-              <a:buNone/>
-              <a:defRPr sz="1200"/>
+            <a:lvl5pPr marL="1310335" indent="0" algn="ctr">
+              <a:buNone/>
+              <a:defRPr sz="1146"/>
             </a:lvl5pPr>
-            <a:lvl6pPr marL="1714500" indent="0" algn="ctr">
-              <a:buNone/>
-              <a:defRPr sz="1200"/>
+            <a:lvl6pPr marL="1637919" indent="0" algn="ctr">
+              <a:buNone/>
+              <a:defRPr sz="1146"/>
             </a:lvl6pPr>
-            <a:lvl7pPr marL="2057400" indent="0" algn="ctr">
-              <a:buNone/>
-              <a:defRPr sz="1200"/>
+            <a:lvl7pPr marL="1965503" indent="0" algn="ctr">
+              <a:buNone/>
+              <a:defRPr sz="1146"/>
             </a:lvl7pPr>
-            <a:lvl8pPr marL="2400300" indent="0" algn="ctr">
-              <a:buNone/>
-              <a:defRPr sz="1200"/>
+            <a:lvl8pPr marL="2293087" indent="0" algn="ctr">
+              <a:buNone/>
+              <a:defRPr sz="1146"/>
             </a:lvl8pPr>
-            <a:lvl9pPr marL="2743200" indent="0" algn="ctr">
-              <a:buNone/>
-              <a:defRPr sz="1200"/>
+            <a:lvl9pPr marL="2620670" indent="0" algn="ctr">
+              <a:buNone/>
+              <a:defRPr sz="1146"/>
             </a:lvl9pPr>
           </a:lstStyle>
           <a:p>
@@ -238,7 +367,7 @@
           <a:p>
             <a:fld id="{7DA630C9-F8A3-479A-9A07-CCE6BDA0FBFA}" type="datetimeFigureOut">
               <a:rPr lang="en-GB" smtClean="0"/>
-              <a:t>08/09/2023</a:t>
+              <a:t>12/09/2023</a:t>
             </a:fld>
             <a:endParaRPr lang="en-GB"/>
           </a:p>
@@ -289,7 +418,7 @@
     </p:spTree>
     <p:extLst>
       <p:ext uri="{BB962C8B-B14F-4D97-AF65-F5344CB8AC3E}">
-        <p14:creationId xmlns:p14="http://schemas.microsoft.com/office/powerpoint/2010/main" val="170021878"/>
+        <p14:creationId xmlns:p14="http://schemas.microsoft.com/office/powerpoint/2010/main" val="1107328287"/>
       </p:ext>
     </p:extLst>
   </p:cSld>
@@ -408,7 +537,7 @@
           <a:p>
             <a:fld id="{7DA630C9-F8A3-479A-9A07-CCE6BDA0FBFA}" type="datetimeFigureOut">
               <a:rPr lang="en-GB" smtClean="0"/>
-              <a:t>08/09/2023</a:t>
+              <a:t>12/09/2023</a:t>
             </a:fld>
             <a:endParaRPr lang="en-GB"/>
           </a:p>
@@ -459,7 +588,7 @@
     </p:spTree>
     <p:extLst>
       <p:ext uri="{BB962C8B-B14F-4D97-AF65-F5344CB8AC3E}">
-        <p14:creationId xmlns:p14="http://schemas.microsoft.com/office/powerpoint/2010/main" val="137302314"/>
+        <p14:creationId xmlns:p14="http://schemas.microsoft.com/office/powerpoint/2010/main" val="3364643176"/>
       </p:ext>
     </p:extLst>
   </p:cSld>
@@ -498,8 +627,8 @@
         </p:nvSpPr>
         <p:spPr>
           <a:xfrm>
-            <a:off x="4907757" y="319146"/>
-            <a:ext cx="1478756" cy="5079977"/>
+            <a:off x="4688498" y="319146"/>
+            <a:ext cx="1412692" cy="5079977"/>
           </a:xfrm>
         </p:spPr>
         <p:txBody>
@@ -526,8 +655,8 @@
         </p:nvSpPr>
         <p:spPr>
           <a:xfrm>
-            <a:off x="471488" y="319146"/>
-            <a:ext cx="4350544" cy="5079977"/>
+            <a:off x="450424" y="319146"/>
+            <a:ext cx="4156179" cy="5079977"/>
           </a:xfrm>
         </p:spPr>
         <p:txBody>
@@ -588,7 +717,7 @@
           <a:p>
             <a:fld id="{7DA630C9-F8A3-479A-9A07-CCE6BDA0FBFA}" type="datetimeFigureOut">
               <a:rPr lang="en-GB" smtClean="0"/>
-              <a:t>08/09/2023</a:t>
+              <a:t>12/09/2023</a:t>
             </a:fld>
             <a:endParaRPr lang="en-GB"/>
           </a:p>
@@ -639,7 +768,7 @@
     </p:spTree>
     <p:extLst>
       <p:ext uri="{BB962C8B-B14F-4D97-AF65-F5344CB8AC3E}">
-        <p14:creationId xmlns:p14="http://schemas.microsoft.com/office/powerpoint/2010/main" val="1687356705"/>
+        <p14:creationId xmlns:p14="http://schemas.microsoft.com/office/powerpoint/2010/main" val="3351864340"/>
       </p:ext>
     </p:extLst>
   </p:cSld>
@@ -758,7 +887,7 @@
           <a:p>
             <a:fld id="{7DA630C9-F8A3-479A-9A07-CCE6BDA0FBFA}" type="datetimeFigureOut">
               <a:rPr lang="en-GB" smtClean="0"/>
-              <a:t>08/09/2023</a:t>
+              <a:t>12/09/2023</a:t>
             </a:fld>
             <a:endParaRPr lang="en-GB"/>
           </a:p>
@@ -809,7 +938,7 @@
     </p:spTree>
     <p:extLst>
       <p:ext uri="{BB962C8B-B14F-4D97-AF65-F5344CB8AC3E}">
-        <p14:creationId xmlns:p14="http://schemas.microsoft.com/office/powerpoint/2010/main" val="2312479489"/>
+        <p14:creationId xmlns:p14="http://schemas.microsoft.com/office/powerpoint/2010/main" val="924877336"/>
       </p:ext>
     </p:extLst>
   </p:cSld>
@@ -848,15 +977,15 @@
         </p:nvSpPr>
         <p:spPr>
           <a:xfrm>
-            <a:off x="467916" y="1494439"/>
-            <a:ext cx="5915025" cy="2493503"/>
+            <a:off x="447012" y="1494439"/>
+            <a:ext cx="5650766" cy="2493503"/>
           </a:xfrm>
         </p:spPr>
         <p:txBody>
           <a:bodyPr anchor="b"/>
           <a:lstStyle>
             <a:lvl1pPr>
-              <a:defRPr sz="4500"/>
+              <a:defRPr sz="4299"/>
             </a:lvl1pPr>
           </a:lstStyle>
           <a:p>
@@ -880,8 +1009,8 @@
         </p:nvSpPr>
         <p:spPr>
           <a:xfrm>
-            <a:off x="467916" y="4011532"/>
-            <a:ext cx="5915025" cy="1311275"/>
+            <a:off x="447012" y="4011532"/>
+            <a:ext cx="5650766" cy="1311275"/>
           </a:xfrm>
         </p:spPr>
         <p:txBody>
@@ -889,15 +1018,15 @@
           <a:lstStyle>
             <a:lvl1pPr marL="0" indent="0">
               <a:buNone/>
-              <a:defRPr sz="1800">
+              <a:defRPr sz="1720">
                 <a:solidFill>
                   <a:schemeClr val="tx1"/>
                 </a:solidFill>
               </a:defRPr>
             </a:lvl1pPr>
-            <a:lvl2pPr marL="342900" indent="0">
-              <a:buNone/>
-              <a:defRPr sz="1500">
+            <a:lvl2pPr marL="327584" indent="0">
+              <a:buNone/>
+              <a:defRPr sz="1433">
                 <a:solidFill>
                   <a:schemeClr val="tx1">
                     <a:tint val="75000"/>
@@ -905,9 +1034,9 @@
                 </a:solidFill>
               </a:defRPr>
             </a:lvl2pPr>
-            <a:lvl3pPr marL="685800" indent="0">
-              <a:buNone/>
-              <a:defRPr sz="1350">
+            <a:lvl3pPr marL="655168" indent="0">
+              <a:buNone/>
+              <a:defRPr sz="1290">
                 <a:solidFill>
                   <a:schemeClr val="tx1">
                     <a:tint val="75000"/>
@@ -915,9 +1044,9 @@
                 </a:solidFill>
               </a:defRPr>
             </a:lvl3pPr>
-            <a:lvl4pPr marL="1028700" indent="0">
-              <a:buNone/>
-              <a:defRPr sz="1200">
+            <a:lvl4pPr marL="982751" indent="0">
+              <a:buNone/>
+              <a:defRPr sz="1146">
                 <a:solidFill>
                   <a:schemeClr val="tx1">
                     <a:tint val="75000"/>
@@ -925,9 +1054,9 @@
                 </a:solidFill>
               </a:defRPr>
             </a:lvl4pPr>
-            <a:lvl5pPr marL="1371600" indent="0">
-              <a:buNone/>
-              <a:defRPr sz="1200">
+            <a:lvl5pPr marL="1310335" indent="0">
+              <a:buNone/>
+              <a:defRPr sz="1146">
                 <a:solidFill>
                   <a:schemeClr val="tx1">
                     <a:tint val="75000"/>
@@ -935,9 +1064,9 @@
                 </a:solidFill>
               </a:defRPr>
             </a:lvl5pPr>
-            <a:lvl6pPr marL="1714500" indent="0">
-              <a:buNone/>
-              <a:defRPr sz="1200">
+            <a:lvl6pPr marL="1637919" indent="0">
+              <a:buNone/>
+              <a:defRPr sz="1146">
                 <a:solidFill>
                   <a:schemeClr val="tx1">
                     <a:tint val="75000"/>
@@ -945,9 +1074,9 @@
                 </a:solidFill>
               </a:defRPr>
             </a:lvl6pPr>
-            <a:lvl7pPr marL="2057400" indent="0">
-              <a:buNone/>
-              <a:defRPr sz="1200">
+            <a:lvl7pPr marL="1965503" indent="0">
+              <a:buNone/>
+              <a:defRPr sz="1146">
                 <a:solidFill>
                   <a:schemeClr val="tx1">
                     <a:tint val="75000"/>
@@ -955,9 +1084,9 @@
                 </a:solidFill>
               </a:defRPr>
             </a:lvl7pPr>
-            <a:lvl8pPr marL="2400300" indent="0">
-              <a:buNone/>
-              <a:defRPr sz="1200">
+            <a:lvl8pPr marL="2293087" indent="0">
+              <a:buNone/>
+              <a:defRPr sz="1146">
                 <a:solidFill>
                   <a:schemeClr val="tx1">
                     <a:tint val="75000"/>
@@ -965,9 +1094,9 @@
                 </a:solidFill>
               </a:defRPr>
             </a:lvl8pPr>
-            <a:lvl9pPr marL="2743200" indent="0">
-              <a:buNone/>
-              <a:defRPr sz="1200">
+            <a:lvl9pPr marL="2620670" indent="0">
+              <a:buNone/>
+              <a:defRPr sz="1146">
                 <a:solidFill>
                   <a:schemeClr val="tx1">
                     <a:tint val="75000"/>
@@ -1002,7 +1131,7 @@
           <a:p>
             <a:fld id="{7DA630C9-F8A3-479A-9A07-CCE6BDA0FBFA}" type="datetimeFigureOut">
               <a:rPr lang="en-GB" smtClean="0"/>
-              <a:t>08/09/2023</a:t>
+              <a:t>12/09/2023</a:t>
             </a:fld>
             <a:endParaRPr lang="en-GB"/>
           </a:p>
@@ -1053,7 +1182,7 @@
     </p:spTree>
     <p:extLst>
       <p:ext uri="{BB962C8B-B14F-4D97-AF65-F5344CB8AC3E}">
-        <p14:creationId xmlns:p14="http://schemas.microsoft.com/office/powerpoint/2010/main" val="415272662"/>
+        <p14:creationId xmlns:p14="http://schemas.microsoft.com/office/powerpoint/2010/main" val="1736956701"/>
       </p:ext>
     </p:extLst>
   </p:cSld>
@@ -1115,8 +1244,8 @@
         </p:nvSpPr>
         <p:spPr>
           <a:xfrm>
-            <a:off x="471488" y="1595731"/>
-            <a:ext cx="2914650" cy="3803392"/>
+            <a:off x="450423" y="1595731"/>
+            <a:ext cx="2784436" cy="3803392"/>
           </a:xfrm>
         </p:spPr>
         <p:txBody>
@@ -1172,8 +1301,8 @@
         </p:nvSpPr>
         <p:spPr>
           <a:xfrm>
-            <a:off x="3471863" y="1595731"/>
-            <a:ext cx="2914650" cy="3803392"/>
+            <a:off x="3316754" y="1595731"/>
+            <a:ext cx="2784436" cy="3803392"/>
           </a:xfrm>
         </p:spPr>
         <p:txBody>
@@ -1234,7 +1363,7 @@
           <a:p>
             <a:fld id="{7DA630C9-F8A3-479A-9A07-CCE6BDA0FBFA}" type="datetimeFigureOut">
               <a:rPr lang="en-GB" smtClean="0"/>
-              <a:t>08/09/2023</a:t>
+              <a:t>12/09/2023</a:t>
             </a:fld>
             <a:endParaRPr lang="en-GB"/>
           </a:p>
@@ -1285,7 +1414,7 @@
     </p:spTree>
     <p:extLst>
       <p:ext uri="{BB962C8B-B14F-4D97-AF65-F5344CB8AC3E}">
-        <p14:creationId xmlns:p14="http://schemas.microsoft.com/office/powerpoint/2010/main" val="2005251765"/>
+        <p14:creationId xmlns:p14="http://schemas.microsoft.com/office/powerpoint/2010/main" val="1190464636"/>
       </p:ext>
     </p:extLst>
   </p:cSld>
@@ -1324,8 +1453,8 @@
         </p:nvSpPr>
         <p:spPr>
           <a:xfrm>
-            <a:off x="472381" y="319148"/>
-            <a:ext cx="5915025" cy="1158640"/>
+            <a:off x="451277" y="319148"/>
+            <a:ext cx="5650766" cy="1158640"/>
           </a:xfrm>
         </p:spPr>
         <p:txBody>
@@ -1352,8 +1481,8 @@
         </p:nvSpPr>
         <p:spPr>
           <a:xfrm>
-            <a:off x="472381" y="1469461"/>
-            <a:ext cx="2901255" cy="720160"/>
+            <a:off x="451277" y="1469461"/>
+            <a:ext cx="2771639" cy="720160"/>
           </a:xfrm>
         </p:spPr>
         <p:txBody>
@@ -1361,39 +1490,39 @@
           <a:lstStyle>
             <a:lvl1pPr marL="0" indent="0">
               <a:buNone/>
-              <a:defRPr sz="1800" b="1"/>
+              <a:defRPr sz="1720" b="1"/>
             </a:lvl1pPr>
-            <a:lvl2pPr marL="342900" indent="0">
-              <a:buNone/>
-              <a:defRPr sz="1500" b="1"/>
+            <a:lvl2pPr marL="327584" indent="0">
+              <a:buNone/>
+              <a:defRPr sz="1433" b="1"/>
             </a:lvl2pPr>
-            <a:lvl3pPr marL="685800" indent="0">
-              <a:buNone/>
-              <a:defRPr sz="1350" b="1"/>
+            <a:lvl3pPr marL="655168" indent="0">
+              <a:buNone/>
+              <a:defRPr sz="1290" b="1"/>
             </a:lvl3pPr>
-            <a:lvl4pPr marL="1028700" indent="0">
-              <a:buNone/>
-              <a:defRPr sz="1200" b="1"/>
+            <a:lvl4pPr marL="982751" indent="0">
+              <a:buNone/>
+              <a:defRPr sz="1146" b="1"/>
             </a:lvl4pPr>
-            <a:lvl5pPr marL="1371600" indent="0">
-              <a:buNone/>
-              <a:defRPr sz="1200" b="1"/>
+            <a:lvl5pPr marL="1310335" indent="0">
+              <a:buNone/>
+              <a:defRPr sz="1146" b="1"/>
             </a:lvl5pPr>
-            <a:lvl6pPr marL="1714500" indent="0">
-              <a:buNone/>
-              <a:defRPr sz="1200" b="1"/>
+            <a:lvl6pPr marL="1637919" indent="0">
+              <a:buNone/>
+              <a:defRPr sz="1146" b="1"/>
             </a:lvl6pPr>
-            <a:lvl7pPr marL="2057400" indent="0">
-              <a:buNone/>
-              <a:defRPr sz="1200" b="1"/>
+            <a:lvl7pPr marL="1965503" indent="0">
+              <a:buNone/>
+              <a:defRPr sz="1146" b="1"/>
             </a:lvl7pPr>
-            <a:lvl8pPr marL="2400300" indent="0">
-              <a:buNone/>
-              <a:defRPr sz="1200" b="1"/>
+            <a:lvl8pPr marL="2293087" indent="0">
+              <a:buNone/>
+              <a:defRPr sz="1146" b="1"/>
             </a:lvl8pPr>
-            <a:lvl9pPr marL="2743200" indent="0">
-              <a:buNone/>
-              <a:defRPr sz="1200" b="1"/>
+            <a:lvl9pPr marL="2620670" indent="0">
+              <a:buNone/>
+              <a:defRPr sz="1146" b="1"/>
             </a:lvl9pPr>
           </a:lstStyle>
           <a:p>
@@ -1417,8 +1546,8 @@
         </p:nvSpPr>
         <p:spPr>
           <a:xfrm>
-            <a:off x="472381" y="2189621"/>
-            <a:ext cx="2901255" cy="3220603"/>
+            <a:off x="451277" y="2189621"/>
+            <a:ext cx="2771639" cy="3220603"/>
           </a:xfrm>
         </p:spPr>
         <p:txBody>
@@ -1474,8 +1603,8 @@
         </p:nvSpPr>
         <p:spPr>
           <a:xfrm>
-            <a:off x="3471863" y="1469461"/>
-            <a:ext cx="2915543" cy="720160"/>
+            <a:off x="3316754" y="1469461"/>
+            <a:ext cx="2785289" cy="720160"/>
           </a:xfrm>
         </p:spPr>
         <p:txBody>
@@ -1483,39 +1612,39 @@
           <a:lstStyle>
             <a:lvl1pPr marL="0" indent="0">
               <a:buNone/>
-              <a:defRPr sz="1800" b="1"/>
+              <a:defRPr sz="1720" b="1"/>
             </a:lvl1pPr>
-            <a:lvl2pPr marL="342900" indent="0">
-              <a:buNone/>
-              <a:defRPr sz="1500" b="1"/>
+            <a:lvl2pPr marL="327584" indent="0">
+              <a:buNone/>
+              <a:defRPr sz="1433" b="1"/>
             </a:lvl2pPr>
-            <a:lvl3pPr marL="685800" indent="0">
-              <a:buNone/>
-              <a:defRPr sz="1350" b="1"/>
+            <a:lvl3pPr marL="655168" indent="0">
+              <a:buNone/>
+              <a:defRPr sz="1290" b="1"/>
             </a:lvl3pPr>
-            <a:lvl4pPr marL="1028700" indent="0">
-              <a:buNone/>
-              <a:defRPr sz="1200" b="1"/>
+            <a:lvl4pPr marL="982751" indent="0">
+              <a:buNone/>
+              <a:defRPr sz="1146" b="1"/>
             </a:lvl4pPr>
-            <a:lvl5pPr marL="1371600" indent="0">
-              <a:buNone/>
-              <a:defRPr sz="1200" b="1"/>
+            <a:lvl5pPr marL="1310335" indent="0">
+              <a:buNone/>
+              <a:defRPr sz="1146" b="1"/>
             </a:lvl5pPr>
-            <a:lvl6pPr marL="1714500" indent="0">
-              <a:buNone/>
-              <a:defRPr sz="1200" b="1"/>
+            <a:lvl6pPr marL="1637919" indent="0">
+              <a:buNone/>
+              <a:defRPr sz="1146" b="1"/>
             </a:lvl6pPr>
-            <a:lvl7pPr marL="2057400" indent="0">
-              <a:buNone/>
-              <a:defRPr sz="1200" b="1"/>
+            <a:lvl7pPr marL="1965503" indent="0">
+              <a:buNone/>
+              <a:defRPr sz="1146" b="1"/>
             </a:lvl7pPr>
-            <a:lvl8pPr marL="2400300" indent="0">
-              <a:buNone/>
-              <a:defRPr sz="1200" b="1"/>
+            <a:lvl8pPr marL="2293087" indent="0">
+              <a:buNone/>
+              <a:defRPr sz="1146" b="1"/>
             </a:lvl8pPr>
-            <a:lvl9pPr marL="2743200" indent="0">
-              <a:buNone/>
-              <a:defRPr sz="1200" b="1"/>
+            <a:lvl9pPr marL="2620670" indent="0">
+              <a:buNone/>
+              <a:defRPr sz="1146" b="1"/>
             </a:lvl9pPr>
           </a:lstStyle>
           <a:p>
@@ -1539,8 +1668,8 @@
         </p:nvSpPr>
         <p:spPr>
           <a:xfrm>
-            <a:off x="3471863" y="2189621"/>
-            <a:ext cx="2915543" cy="3220603"/>
+            <a:off x="3316754" y="2189621"/>
+            <a:ext cx="2785289" cy="3220603"/>
           </a:xfrm>
         </p:spPr>
         <p:txBody>
@@ -1601,7 +1730,7 @@
           <a:p>
             <a:fld id="{7DA630C9-F8A3-479A-9A07-CCE6BDA0FBFA}" type="datetimeFigureOut">
               <a:rPr lang="en-GB" smtClean="0"/>
-              <a:t>08/09/2023</a:t>
+              <a:t>12/09/2023</a:t>
             </a:fld>
             <a:endParaRPr lang="en-GB"/>
           </a:p>
@@ -1652,7 +1781,7 @@
     </p:spTree>
     <p:extLst>
       <p:ext uri="{BB962C8B-B14F-4D97-AF65-F5344CB8AC3E}">
-        <p14:creationId xmlns:p14="http://schemas.microsoft.com/office/powerpoint/2010/main" val="2622733029"/>
+        <p14:creationId xmlns:p14="http://schemas.microsoft.com/office/powerpoint/2010/main" val="2179683271"/>
       </p:ext>
     </p:extLst>
   </p:cSld>
@@ -1719,7 +1848,7 @@
           <a:p>
             <a:fld id="{7DA630C9-F8A3-479A-9A07-CCE6BDA0FBFA}" type="datetimeFigureOut">
               <a:rPr lang="en-GB" smtClean="0"/>
-              <a:t>08/09/2023</a:t>
+              <a:t>12/09/2023</a:t>
             </a:fld>
             <a:endParaRPr lang="en-GB"/>
           </a:p>
@@ -1770,7 +1899,7 @@
     </p:spTree>
     <p:extLst>
       <p:ext uri="{BB962C8B-B14F-4D97-AF65-F5344CB8AC3E}">
-        <p14:creationId xmlns:p14="http://schemas.microsoft.com/office/powerpoint/2010/main" val="1549350565"/>
+        <p14:creationId xmlns:p14="http://schemas.microsoft.com/office/powerpoint/2010/main" val="1458328833"/>
       </p:ext>
     </p:extLst>
   </p:cSld>
@@ -1814,7 +1943,7 @@
           <a:p>
             <a:fld id="{7DA630C9-F8A3-479A-9A07-CCE6BDA0FBFA}" type="datetimeFigureOut">
               <a:rPr lang="en-GB" smtClean="0"/>
-              <a:t>08/09/2023</a:t>
+              <a:t>12/09/2023</a:t>
             </a:fld>
             <a:endParaRPr lang="en-GB"/>
           </a:p>
@@ -1865,7 +1994,7 @@
     </p:spTree>
     <p:extLst>
       <p:ext uri="{BB962C8B-B14F-4D97-AF65-F5344CB8AC3E}">
-        <p14:creationId xmlns:p14="http://schemas.microsoft.com/office/powerpoint/2010/main" val="923240635"/>
+        <p14:creationId xmlns:p14="http://schemas.microsoft.com/office/powerpoint/2010/main" val="407360828"/>
       </p:ext>
     </p:extLst>
   </p:cSld>
@@ -1904,15 +2033,15 @@
         </p:nvSpPr>
         <p:spPr>
           <a:xfrm>
-            <a:off x="472381" y="399627"/>
-            <a:ext cx="2211884" cy="1398693"/>
+            <a:off x="451277" y="399627"/>
+            <a:ext cx="2113066" cy="1398693"/>
           </a:xfrm>
         </p:spPr>
         <p:txBody>
           <a:bodyPr anchor="b"/>
           <a:lstStyle>
             <a:lvl1pPr>
-              <a:defRPr sz="2400"/>
+              <a:defRPr sz="2293"/>
             </a:lvl1pPr>
           </a:lstStyle>
           <a:p>
@@ -1936,39 +2065,39 @@
         </p:nvSpPr>
         <p:spPr>
           <a:xfrm>
-            <a:off x="2915543" y="863084"/>
-            <a:ext cx="3471863" cy="4259909"/>
+            <a:off x="2785289" y="863084"/>
+            <a:ext cx="3316754" cy="4259909"/>
           </a:xfrm>
         </p:spPr>
         <p:txBody>
           <a:bodyPr/>
           <a:lstStyle>
             <a:lvl1pPr>
-              <a:defRPr sz="2400"/>
+              <a:defRPr sz="2293"/>
             </a:lvl1pPr>
             <a:lvl2pPr>
-              <a:defRPr sz="2100"/>
+              <a:defRPr sz="2006"/>
             </a:lvl2pPr>
             <a:lvl3pPr>
-              <a:defRPr sz="1800"/>
+              <a:defRPr sz="1720"/>
             </a:lvl3pPr>
             <a:lvl4pPr>
-              <a:defRPr sz="1500"/>
+              <a:defRPr sz="1433"/>
             </a:lvl4pPr>
             <a:lvl5pPr>
-              <a:defRPr sz="1500"/>
+              <a:defRPr sz="1433"/>
             </a:lvl5pPr>
             <a:lvl6pPr>
-              <a:defRPr sz="1500"/>
+              <a:defRPr sz="1433"/>
             </a:lvl6pPr>
             <a:lvl7pPr>
-              <a:defRPr sz="1500"/>
+              <a:defRPr sz="1433"/>
             </a:lvl7pPr>
             <a:lvl8pPr>
-              <a:defRPr sz="1500"/>
+              <a:defRPr sz="1433"/>
             </a:lvl8pPr>
             <a:lvl9pPr>
-              <a:defRPr sz="1500"/>
+              <a:defRPr sz="1433"/>
             </a:lvl9pPr>
           </a:lstStyle>
           <a:p>
@@ -2021,8 +2150,8 @@
         </p:nvSpPr>
         <p:spPr>
           <a:xfrm>
-            <a:off x="472381" y="1798320"/>
-            <a:ext cx="2211884" cy="3331610"/>
+            <a:off x="451277" y="1798320"/>
+            <a:ext cx="2113066" cy="3331610"/>
           </a:xfrm>
         </p:spPr>
         <p:txBody>
@@ -2030,39 +2159,39 @@
           <a:lstStyle>
             <a:lvl1pPr marL="0" indent="0">
               <a:buNone/>
-              <a:defRPr sz="1200"/>
+              <a:defRPr sz="1146"/>
             </a:lvl1pPr>
-            <a:lvl2pPr marL="342900" indent="0">
-              <a:buNone/>
-              <a:defRPr sz="1050"/>
+            <a:lvl2pPr marL="327584" indent="0">
+              <a:buNone/>
+              <a:defRPr sz="1003"/>
             </a:lvl2pPr>
-            <a:lvl3pPr marL="685800" indent="0">
-              <a:buNone/>
-              <a:defRPr sz="900"/>
+            <a:lvl3pPr marL="655168" indent="0">
+              <a:buNone/>
+              <a:defRPr sz="860"/>
             </a:lvl3pPr>
-            <a:lvl4pPr marL="1028700" indent="0">
-              <a:buNone/>
-              <a:defRPr sz="750"/>
+            <a:lvl4pPr marL="982751" indent="0">
+              <a:buNone/>
+              <a:defRPr sz="717"/>
             </a:lvl4pPr>
-            <a:lvl5pPr marL="1371600" indent="0">
-              <a:buNone/>
-              <a:defRPr sz="750"/>
+            <a:lvl5pPr marL="1310335" indent="0">
+              <a:buNone/>
+              <a:defRPr sz="717"/>
             </a:lvl5pPr>
-            <a:lvl6pPr marL="1714500" indent="0">
-              <a:buNone/>
-              <a:defRPr sz="750"/>
+            <a:lvl6pPr marL="1637919" indent="0">
+              <a:buNone/>
+              <a:defRPr sz="717"/>
             </a:lvl6pPr>
-            <a:lvl7pPr marL="2057400" indent="0">
-              <a:buNone/>
-              <a:defRPr sz="750"/>
+            <a:lvl7pPr marL="1965503" indent="0">
+              <a:buNone/>
+              <a:defRPr sz="717"/>
             </a:lvl7pPr>
-            <a:lvl8pPr marL="2400300" indent="0">
-              <a:buNone/>
-              <a:defRPr sz="750"/>
+            <a:lvl8pPr marL="2293087" indent="0">
+              <a:buNone/>
+              <a:defRPr sz="717"/>
             </a:lvl8pPr>
-            <a:lvl9pPr marL="2743200" indent="0">
-              <a:buNone/>
-              <a:defRPr sz="750"/>
+            <a:lvl9pPr marL="2620670" indent="0">
+              <a:buNone/>
+              <a:defRPr sz="717"/>
             </a:lvl9pPr>
           </a:lstStyle>
           <a:p>
@@ -2091,7 +2220,7 @@
           <a:p>
             <a:fld id="{7DA630C9-F8A3-479A-9A07-CCE6BDA0FBFA}" type="datetimeFigureOut">
               <a:rPr lang="en-GB" smtClean="0"/>
-              <a:t>08/09/2023</a:t>
+              <a:t>12/09/2023</a:t>
             </a:fld>
             <a:endParaRPr lang="en-GB"/>
           </a:p>
@@ -2142,7 +2271,7 @@
     </p:spTree>
     <p:extLst>
       <p:ext uri="{BB962C8B-B14F-4D97-AF65-F5344CB8AC3E}">
-        <p14:creationId xmlns:p14="http://schemas.microsoft.com/office/powerpoint/2010/main" val="3078337148"/>
+        <p14:creationId xmlns:p14="http://schemas.microsoft.com/office/powerpoint/2010/main" val="2361138051"/>
       </p:ext>
     </p:extLst>
   </p:cSld>
@@ -2181,15 +2310,15 @@
         </p:nvSpPr>
         <p:spPr>
           <a:xfrm>
-            <a:off x="472381" y="399627"/>
-            <a:ext cx="2211884" cy="1398693"/>
+            <a:off x="451277" y="399627"/>
+            <a:ext cx="2113066" cy="1398693"/>
           </a:xfrm>
         </p:spPr>
         <p:txBody>
           <a:bodyPr anchor="b"/>
           <a:lstStyle>
             <a:lvl1pPr>
-              <a:defRPr sz="2400"/>
+              <a:defRPr sz="2293"/>
             </a:lvl1pPr>
           </a:lstStyle>
           <a:p>
@@ -2213,8 +2342,8 @@
         </p:nvSpPr>
         <p:spPr>
           <a:xfrm>
-            <a:off x="2915543" y="863084"/>
-            <a:ext cx="3471863" cy="4259909"/>
+            <a:off x="2785289" y="863084"/>
+            <a:ext cx="3316754" cy="4259909"/>
           </a:xfrm>
         </p:spPr>
         <p:txBody>
@@ -2222,39 +2351,39 @@
           <a:lstStyle>
             <a:lvl1pPr marL="0" indent="0">
               <a:buNone/>
-              <a:defRPr sz="2400"/>
+              <a:defRPr sz="2293"/>
             </a:lvl1pPr>
-            <a:lvl2pPr marL="342900" indent="0">
-              <a:buNone/>
-              <a:defRPr sz="2100"/>
+            <a:lvl2pPr marL="327584" indent="0">
+              <a:buNone/>
+              <a:defRPr sz="2006"/>
             </a:lvl2pPr>
-            <a:lvl3pPr marL="685800" indent="0">
-              <a:buNone/>
-              <a:defRPr sz="1800"/>
+            <a:lvl3pPr marL="655168" indent="0">
+              <a:buNone/>
+              <a:defRPr sz="1720"/>
             </a:lvl3pPr>
-            <a:lvl4pPr marL="1028700" indent="0">
-              <a:buNone/>
-              <a:defRPr sz="1500"/>
+            <a:lvl4pPr marL="982751" indent="0">
+              <a:buNone/>
+              <a:defRPr sz="1433"/>
             </a:lvl4pPr>
-            <a:lvl5pPr marL="1371600" indent="0">
-              <a:buNone/>
-              <a:defRPr sz="1500"/>
+            <a:lvl5pPr marL="1310335" indent="0">
+              <a:buNone/>
+              <a:defRPr sz="1433"/>
             </a:lvl5pPr>
-            <a:lvl6pPr marL="1714500" indent="0">
-              <a:buNone/>
-              <a:defRPr sz="1500"/>
+            <a:lvl6pPr marL="1637919" indent="0">
+              <a:buNone/>
+              <a:defRPr sz="1433"/>
             </a:lvl6pPr>
-            <a:lvl7pPr marL="2057400" indent="0">
-              <a:buNone/>
-              <a:defRPr sz="1500"/>
+            <a:lvl7pPr marL="1965503" indent="0">
+              <a:buNone/>
+              <a:defRPr sz="1433"/>
             </a:lvl7pPr>
-            <a:lvl8pPr marL="2400300" indent="0">
-              <a:buNone/>
-              <a:defRPr sz="1500"/>
+            <a:lvl8pPr marL="2293087" indent="0">
+              <a:buNone/>
+              <a:defRPr sz="1433"/>
             </a:lvl8pPr>
-            <a:lvl9pPr marL="2743200" indent="0">
-              <a:buNone/>
-              <a:defRPr sz="1500"/>
+            <a:lvl9pPr marL="2620670" indent="0">
+              <a:buNone/>
+              <a:defRPr sz="1433"/>
             </a:lvl9pPr>
           </a:lstStyle>
           <a:p>
@@ -2278,8 +2407,8 @@
         </p:nvSpPr>
         <p:spPr>
           <a:xfrm>
-            <a:off x="472381" y="1798320"/>
-            <a:ext cx="2211884" cy="3331610"/>
+            <a:off x="451277" y="1798320"/>
+            <a:ext cx="2113066" cy="3331610"/>
           </a:xfrm>
         </p:spPr>
         <p:txBody>
@@ -2287,39 +2416,39 @@
           <a:lstStyle>
             <a:lvl1pPr marL="0" indent="0">
               <a:buNone/>
-              <a:defRPr sz="1200"/>
+              <a:defRPr sz="1146"/>
             </a:lvl1pPr>
-            <a:lvl2pPr marL="342900" indent="0">
-              <a:buNone/>
-              <a:defRPr sz="1050"/>
+            <a:lvl2pPr marL="327584" indent="0">
+              <a:buNone/>
+              <a:defRPr sz="1003"/>
             </a:lvl2pPr>
-            <a:lvl3pPr marL="685800" indent="0">
-              <a:buNone/>
-              <a:defRPr sz="900"/>
+            <a:lvl3pPr marL="655168" indent="0">
+              <a:buNone/>
+              <a:defRPr sz="860"/>
             </a:lvl3pPr>
-            <a:lvl4pPr marL="1028700" indent="0">
-              <a:buNone/>
-              <a:defRPr sz="750"/>
+            <a:lvl4pPr marL="982751" indent="0">
+              <a:buNone/>
+              <a:defRPr sz="717"/>
             </a:lvl4pPr>
-            <a:lvl5pPr marL="1371600" indent="0">
-              <a:buNone/>
-              <a:defRPr sz="750"/>
+            <a:lvl5pPr marL="1310335" indent="0">
+              <a:buNone/>
+              <a:defRPr sz="717"/>
             </a:lvl5pPr>
-            <a:lvl6pPr marL="1714500" indent="0">
-              <a:buNone/>
-              <a:defRPr sz="750"/>
+            <a:lvl6pPr marL="1637919" indent="0">
+              <a:buNone/>
+              <a:defRPr sz="717"/>
             </a:lvl6pPr>
-            <a:lvl7pPr marL="2057400" indent="0">
-              <a:buNone/>
-              <a:defRPr sz="750"/>
+            <a:lvl7pPr marL="1965503" indent="0">
+              <a:buNone/>
+              <a:defRPr sz="717"/>
             </a:lvl7pPr>
-            <a:lvl8pPr marL="2400300" indent="0">
-              <a:buNone/>
-              <a:defRPr sz="750"/>
+            <a:lvl8pPr marL="2293087" indent="0">
+              <a:buNone/>
+              <a:defRPr sz="717"/>
             </a:lvl8pPr>
-            <a:lvl9pPr marL="2743200" indent="0">
-              <a:buNone/>
-              <a:defRPr sz="750"/>
+            <a:lvl9pPr marL="2620670" indent="0">
+              <a:buNone/>
+              <a:defRPr sz="717"/>
             </a:lvl9pPr>
           </a:lstStyle>
           <a:p>
@@ -2348,7 +2477,7 @@
           <a:p>
             <a:fld id="{7DA630C9-F8A3-479A-9A07-CCE6BDA0FBFA}" type="datetimeFigureOut">
               <a:rPr lang="en-GB" smtClean="0"/>
-              <a:t>08/09/2023</a:t>
+              <a:t>12/09/2023</a:t>
             </a:fld>
             <a:endParaRPr lang="en-GB"/>
           </a:p>
@@ -2399,7 +2528,7 @@
     </p:spTree>
     <p:extLst>
       <p:ext uri="{BB962C8B-B14F-4D97-AF65-F5344CB8AC3E}">
-        <p14:creationId xmlns:p14="http://schemas.microsoft.com/office/powerpoint/2010/main" val="3453494536"/>
+        <p14:creationId xmlns:p14="http://schemas.microsoft.com/office/powerpoint/2010/main" val="2877330677"/>
       </p:ext>
     </p:extLst>
   </p:cSld>
@@ -2443,8 +2572,8 @@
         </p:nvSpPr>
         <p:spPr>
           <a:xfrm>
-            <a:off x="471488" y="319148"/>
-            <a:ext cx="5915025" cy="1158640"/>
+            <a:off x="450424" y="319148"/>
+            <a:ext cx="5650766" cy="1158640"/>
           </a:xfrm>
           <a:prstGeom prst="rect">
             <a:avLst/>
@@ -2476,8 +2605,8 @@
         </p:nvSpPr>
         <p:spPr>
           <a:xfrm>
-            <a:off x="471488" y="1595731"/>
-            <a:ext cx="5915025" cy="3803392"/>
+            <a:off x="450424" y="1595731"/>
+            <a:ext cx="5650766" cy="3803392"/>
           </a:xfrm>
           <a:prstGeom prst="rect">
             <a:avLst/>
@@ -2538,8 +2667,8 @@
         </p:nvSpPr>
         <p:spPr>
           <a:xfrm>
-            <a:off x="471488" y="5555922"/>
-            <a:ext cx="1543050" cy="319146"/>
+            <a:off x="450423" y="5555922"/>
+            <a:ext cx="1474113" cy="319146"/>
           </a:xfrm>
           <a:prstGeom prst="rect">
             <a:avLst/>
@@ -2549,7 +2678,7 @@
           <a:bodyPr vert="horz" lIns="91440" tIns="45720" rIns="91440" bIns="45720" rtlCol="0" anchor="ctr"/>
           <a:lstStyle>
             <a:lvl1pPr algn="l">
-              <a:defRPr sz="900">
+              <a:defRPr sz="860">
                 <a:solidFill>
                   <a:schemeClr val="tx1">
                     <a:tint val="75000"/>
@@ -2561,7 +2690,7 @@
           <a:p>
             <a:fld id="{7DA630C9-F8A3-479A-9A07-CCE6BDA0FBFA}" type="datetimeFigureOut">
               <a:rPr lang="en-GB" smtClean="0"/>
-              <a:t>08/09/2023</a:t>
+              <a:t>12/09/2023</a:t>
             </a:fld>
             <a:endParaRPr lang="en-GB"/>
           </a:p>
@@ -2579,8 +2708,8 @@
         </p:nvSpPr>
         <p:spPr>
           <a:xfrm>
-            <a:off x="2271713" y="5555922"/>
-            <a:ext cx="2314575" cy="319146"/>
+            <a:off x="2170222" y="5555922"/>
+            <a:ext cx="2211169" cy="319146"/>
           </a:xfrm>
           <a:prstGeom prst="rect">
             <a:avLst/>
@@ -2590,7 +2719,7 @@
           <a:bodyPr vert="horz" lIns="91440" tIns="45720" rIns="91440" bIns="45720" rtlCol="0" anchor="ctr"/>
           <a:lstStyle>
             <a:lvl1pPr algn="ctr">
-              <a:defRPr sz="900">
+              <a:defRPr sz="860">
                 <a:solidFill>
                   <a:schemeClr val="tx1">
                     <a:tint val="75000"/>
@@ -2616,8 +2745,8 @@
         </p:nvSpPr>
         <p:spPr>
           <a:xfrm>
-            <a:off x="4843463" y="5555922"/>
-            <a:ext cx="1543050" cy="319146"/>
+            <a:off x="4627077" y="5555922"/>
+            <a:ext cx="1474113" cy="319146"/>
           </a:xfrm>
           <a:prstGeom prst="rect">
             <a:avLst/>
@@ -2627,7 +2756,7 @@
           <a:bodyPr vert="horz" lIns="91440" tIns="45720" rIns="91440" bIns="45720" rtlCol="0" anchor="ctr"/>
           <a:lstStyle>
             <a:lvl1pPr algn="r">
-              <a:defRPr sz="900">
+              <a:defRPr sz="860">
                 <a:solidFill>
                   <a:schemeClr val="tx1">
                     <a:tint val="75000"/>
@@ -2648,27 +2777,27 @@
     </p:spTree>
     <p:extLst>
       <p:ext uri="{BB962C8B-B14F-4D97-AF65-F5344CB8AC3E}">
-        <p14:creationId xmlns:p14="http://schemas.microsoft.com/office/powerpoint/2010/main" val="3569644431"/>
+        <p14:creationId xmlns:p14="http://schemas.microsoft.com/office/powerpoint/2010/main" val="3968806475"/>
       </p:ext>
     </p:extLst>
   </p:cSld>
   <p:clrMap bg1="lt1" tx1="dk1" bg2="lt2" tx2="dk2" accent1="accent1" accent2="accent2" accent3="accent3" accent4="accent4" accent5="accent5" accent6="accent6" hlink="hlink" folHlink="folHlink"/>
   <p:sldLayoutIdLst>
-    <p:sldLayoutId id="2147483673" r:id="rId1"/>
-    <p:sldLayoutId id="2147483674" r:id="rId2"/>
-    <p:sldLayoutId id="2147483675" r:id="rId3"/>
-    <p:sldLayoutId id="2147483676" r:id="rId4"/>
-    <p:sldLayoutId id="2147483677" r:id="rId5"/>
-    <p:sldLayoutId id="2147483678" r:id="rId6"/>
-    <p:sldLayoutId id="2147483679" r:id="rId7"/>
-    <p:sldLayoutId id="2147483680" r:id="rId8"/>
-    <p:sldLayoutId id="2147483681" r:id="rId9"/>
-    <p:sldLayoutId id="2147483682" r:id="rId10"/>
-    <p:sldLayoutId id="2147483683" r:id="rId11"/>
+    <p:sldLayoutId id="2147483685" r:id="rId1"/>
+    <p:sldLayoutId id="2147483686" r:id="rId2"/>
+    <p:sldLayoutId id="2147483687" r:id="rId3"/>
+    <p:sldLayoutId id="2147483688" r:id="rId4"/>
+    <p:sldLayoutId id="2147483689" r:id="rId5"/>
+    <p:sldLayoutId id="2147483690" r:id="rId6"/>
+    <p:sldLayoutId id="2147483691" r:id="rId7"/>
+    <p:sldLayoutId id="2147483692" r:id="rId8"/>
+    <p:sldLayoutId id="2147483693" r:id="rId9"/>
+    <p:sldLayoutId id="2147483694" r:id="rId10"/>
+    <p:sldLayoutId id="2147483695" r:id="rId11"/>
   </p:sldLayoutIdLst>
   <p:txStyles>
     <p:titleStyle>
-      <a:lvl1pPr algn="l" defTabSz="685800" rtl="0" eaLnBrk="1" latinLnBrk="0" hangingPunct="1">
+      <a:lvl1pPr algn="l" defTabSz="655168" rtl="0" eaLnBrk="1" latinLnBrk="0" hangingPunct="1">
         <a:lnSpc>
           <a:spcPct val="90000"/>
         </a:lnSpc>
@@ -2676,7 +2805,7 @@
           <a:spcPct val="0"/>
         </a:spcBef>
         <a:buNone/>
-        <a:defRPr sz="3300" kern="1200">
+        <a:defRPr sz="3153" kern="1200">
           <a:solidFill>
             <a:schemeClr val="tx1"/>
           </a:solidFill>
@@ -2687,16 +2816,16 @@
       </a:lvl1pPr>
     </p:titleStyle>
     <p:bodyStyle>
-      <a:lvl1pPr marL="171450" indent="-171450" algn="l" defTabSz="685800" rtl="0" eaLnBrk="1" latinLnBrk="0" hangingPunct="1">
+      <a:lvl1pPr marL="163792" indent="-163792" algn="l" defTabSz="655168" rtl="0" eaLnBrk="1" latinLnBrk="0" hangingPunct="1">
         <a:lnSpc>
           <a:spcPct val="90000"/>
         </a:lnSpc>
         <a:spcBef>
-          <a:spcPts val="750"/>
+          <a:spcPts val="717"/>
         </a:spcBef>
         <a:buFont typeface="Arial" panose="020B0604020202020204" pitchFamily="34" charset="0"/>
         <a:buChar char="•"/>
-        <a:defRPr sz="2100" kern="1200">
+        <a:defRPr sz="2006" kern="1200">
           <a:solidFill>
             <a:schemeClr val="tx1"/>
           </a:solidFill>
@@ -2705,16 +2834,16 @@
           <a:cs typeface="+mn-cs"/>
         </a:defRPr>
       </a:lvl1pPr>
-      <a:lvl2pPr marL="514350" indent="-171450" algn="l" defTabSz="685800" rtl="0" eaLnBrk="1" latinLnBrk="0" hangingPunct="1">
+      <a:lvl2pPr marL="491376" indent="-163792" algn="l" defTabSz="655168" rtl="0" eaLnBrk="1" latinLnBrk="0" hangingPunct="1">
         <a:lnSpc>
           <a:spcPct val="90000"/>
         </a:lnSpc>
         <a:spcBef>
-          <a:spcPts val="375"/>
+          <a:spcPts val="358"/>
         </a:spcBef>
         <a:buFont typeface="Arial" panose="020B0604020202020204" pitchFamily="34" charset="0"/>
         <a:buChar char="•"/>
-        <a:defRPr sz="1800" kern="1200">
+        <a:defRPr sz="1720" kern="1200">
           <a:solidFill>
             <a:schemeClr val="tx1"/>
           </a:solidFill>
@@ -2723,16 +2852,16 @@
           <a:cs typeface="+mn-cs"/>
         </a:defRPr>
       </a:lvl2pPr>
-      <a:lvl3pPr marL="857250" indent="-171450" algn="l" defTabSz="685800" rtl="0" eaLnBrk="1" latinLnBrk="0" hangingPunct="1">
+      <a:lvl3pPr marL="818960" indent="-163792" algn="l" defTabSz="655168" rtl="0" eaLnBrk="1" latinLnBrk="0" hangingPunct="1">
         <a:lnSpc>
           <a:spcPct val="90000"/>
         </a:lnSpc>
         <a:spcBef>
-          <a:spcPts val="375"/>
+          <a:spcPts val="358"/>
         </a:spcBef>
         <a:buFont typeface="Arial" panose="020B0604020202020204" pitchFamily="34" charset="0"/>
         <a:buChar char="•"/>
-        <a:defRPr sz="1500" kern="1200">
+        <a:defRPr sz="1433" kern="1200">
           <a:solidFill>
             <a:schemeClr val="tx1"/>
           </a:solidFill>
@@ -2741,16 +2870,16 @@
           <a:cs typeface="+mn-cs"/>
         </a:defRPr>
       </a:lvl3pPr>
-      <a:lvl4pPr marL="1200150" indent="-171450" algn="l" defTabSz="685800" rtl="0" eaLnBrk="1" latinLnBrk="0" hangingPunct="1">
+      <a:lvl4pPr marL="1146543" indent="-163792" algn="l" defTabSz="655168" rtl="0" eaLnBrk="1" latinLnBrk="0" hangingPunct="1">
         <a:lnSpc>
           <a:spcPct val="90000"/>
         </a:lnSpc>
         <a:spcBef>
-          <a:spcPts val="375"/>
+          <a:spcPts val="358"/>
         </a:spcBef>
         <a:buFont typeface="Arial" panose="020B0604020202020204" pitchFamily="34" charset="0"/>
         <a:buChar char="•"/>
-        <a:defRPr sz="1350" kern="1200">
+        <a:defRPr sz="1290" kern="1200">
           <a:solidFill>
             <a:schemeClr val="tx1"/>
           </a:solidFill>
@@ -2759,16 +2888,16 @@
           <a:cs typeface="+mn-cs"/>
         </a:defRPr>
       </a:lvl4pPr>
-      <a:lvl5pPr marL="1543050" indent="-171450" algn="l" defTabSz="685800" rtl="0" eaLnBrk="1" latinLnBrk="0" hangingPunct="1">
+      <a:lvl5pPr marL="1474127" indent="-163792" algn="l" defTabSz="655168" rtl="0" eaLnBrk="1" latinLnBrk="0" hangingPunct="1">
         <a:lnSpc>
           <a:spcPct val="90000"/>
         </a:lnSpc>
         <a:spcBef>
-          <a:spcPts val="375"/>
+          <a:spcPts val="358"/>
         </a:spcBef>
         <a:buFont typeface="Arial" panose="020B0604020202020204" pitchFamily="34" charset="0"/>
         <a:buChar char="•"/>
-        <a:defRPr sz="1350" kern="1200">
+        <a:defRPr sz="1290" kern="1200">
           <a:solidFill>
             <a:schemeClr val="tx1"/>
           </a:solidFill>
@@ -2777,16 +2906,16 @@
           <a:cs typeface="+mn-cs"/>
         </a:defRPr>
       </a:lvl5pPr>
-      <a:lvl6pPr marL="1885950" indent="-171450" algn="l" defTabSz="685800" rtl="0" eaLnBrk="1" latinLnBrk="0" hangingPunct="1">
+      <a:lvl6pPr marL="1801711" indent="-163792" algn="l" defTabSz="655168" rtl="0" eaLnBrk="1" latinLnBrk="0" hangingPunct="1">
         <a:lnSpc>
           <a:spcPct val="90000"/>
         </a:lnSpc>
         <a:spcBef>
-          <a:spcPts val="375"/>
+          <a:spcPts val="358"/>
         </a:spcBef>
         <a:buFont typeface="Arial" panose="020B0604020202020204" pitchFamily="34" charset="0"/>
         <a:buChar char="•"/>
-        <a:defRPr sz="1350" kern="1200">
+        <a:defRPr sz="1290" kern="1200">
           <a:solidFill>
             <a:schemeClr val="tx1"/>
           </a:solidFill>
@@ -2795,16 +2924,16 @@
           <a:cs typeface="+mn-cs"/>
         </a:defRPr>
       </a:lvl6pPr>
-      <a:lvl7pPr marL="2228850" indent="-171450" algn="l" defTabSz="685800" rtl="0" eaLnBrk="1" latinLnBrk="0" hangingPunct="1">
+      <a:lvl7pPr marL="2129295" indent="-163792" algn="l" defTabSz="655168" rtl="0" eaLnBrk="1" latinLnBrk="0" hangingPunct="1">
         <a:lnSpc>
           <a:spcPct val="90000"/>
         </a:lnSpc>
         <a:spcBef>
-          <a:spcPts val="375"/>
+          <a:spcPts val="358"/>
         </a:spcBef>
         <a:buFont typeface="Arial" panose="020B0604020202020204" pitchFamily="34" charset="0"/>
         <a:buChar char="•"/>
-        <a:defRPr sz="1350" kern="1200">
+        <a:defRPr sz="1290" kern="1200">
           <a:solidFill>
             <a:schemeClr val="tx1"/>
           </a:solidFill>
@@ -2813,16 +2942,16 @@
           <a:cs typeface="+mn-cs"/>
         </a:defRPr>
       </a:lvl7pPr>
-      <a:lvl8pPr marL="2571750" indent="-171450" algn="l" defTabSz="685800" rtl="0" eaLnBrk="1" latinLnBrk="0" hangingPunct="1">
+      <a:lvl8pPr marL="2456879" indent="-163792" algn="l" defTabSz="655168" rtl="0" eaLnBrk="1" latinLnBrk="0" hangingPunct="1">
         <a:lnSpc>
           <a:spcPct val="90000"/>
         </a:lnSpc>
         <a:spcBef>
-          <a:spcPts val="375"/>
+          <a:spcPts val="358"/>
         </a:spcBef>
         <a:buFont typeface="Arial" panose="020B0604020202020204" pitchFamily="34" charset="0"/>
         <a:buChar char="•"/>
-        <a:defRPr sz="1350" kern="1200">
+        <a:defRPr sz="1290" kern="1200">
           <a:solidFill>
             <a:schemeClr val="tx1"/>
           </a:solidFill>
@@ -2831,16 +2960,16 @@
           <a:cs typeface="+mn-cs"/>
         </a:defRPr>
       </a:lvl8pPr>
-      <a:lvl9pPr marL="2914650" indent="-171450" algn="l" defTabSz="685800" rtl="0" eaLnBrk="1" latinLnBrk="0" hangingPunct="1">
+      <a:lvl9pPr marL="2784462" indent="-163792" algn="l" defTabSz="655168" rtl="0" eaLnBrk="1" latinLnBrk="0" hangingPunct="1">
         <a:lnSpc>
           <a:spcPct val="90000"/>
         </a:lnSpc>
         <a:spcBef>
-          <a:spcPts val="375"/>
+          <a:spcPts val="358"/>
         </a:spcBef>
         <a:buFont typeface="Arial" panose="020B0604020202020204" pitchFamily="34" charset="0"/>
         <a:buChar char="•"/>
-        <a:defRPr sz="1350" kern="1200">
+        <a:defRPr sz="1290" kern="1200">
           <a:solidFill>
             <a:schemeClr val="tx1"/>
           </a:solidFill>
@@ -2854,8 +2983,8 @@
       <a:defPPr>
         <a:defRPr lang="en-US"/>
       </a:defPPr>
-      <a:lvl1pPr marL="0" algn="l" defTabSz="685800" rtl="0" eaLnBrk="1" latinLnBrk="0" hangingPunct="1">
-        <a:defRPr sz="1350" kern="1200">
+      <a:lvl1pPr marL="0" algn="l" defTabSz="655168" rtl="0" eaLnBrk="1" latinLnBrk="0" hangingPunct="1">
+        <a:defRPr sz="1290" kern="1200">
           <a:solidFill>
             <a:schemeClr val="tx1"/>
           </a:solidFill>
@@ -2864,8 +2993,8 @@
           <a:cs typeface="+mn-cs"/>
         </a:defRPr>
       </a:lvl1pPr>
-      <a:lvl2pPr marL="342900" algn="l" defTabSz="685800" rtl="0" eaLnBrk="1" latinLnBrk="0" hangingPunct="1">
-        <a:defRPr sz="1350" kern="1200">
+      <a:lvl2pPr marL="327584" algn="l" defTabSz="655168" rtl="0" eaLnBrk="1" latinLnBrk="0" hangingPunct="1">
+        <a:defRPr sz="1290" kern="1200">
           <a:solidFill>
             <a:schemeClr val="tx1"/>
           </a:solidFill>
@@ -2874,8 +3003,8 @@
           <a:cs typeface="+mn-cs"/>
         </a:defRPr>
       </a:lvl2pPr>
-      <a:lvl3pPr marL="685800" algn="l" defTabSz="685800" rtl="0" eaLnBrk="1" latinLnBrk="0" hangingPunct="1">
-        <a:defRPr sz="1350" kern="1200">
+      <a:lvl3pPr marL="655168" algn="l" defTabSz="655168" rtl="0" eaLnBrk="1" latinLnBrk="0" hangingPunct="1">
+        <a:defRPr sz="1290" kern="1200">
           <a:solidFill>
             <a:schemeClr val="tx1"/>
           </a:solidFill>
@@ -2884,8 +3013,8 @@
           <a:cs typeface="+mn-cs"/>
         </a:defRPr>
       </a:lvl3pPr>
-      <a:lvl4pPr marL="1028700" algn="l" defTabSz="685800" rtl="0" eaLnBrk="1" latinLnBrk="0" hangingPunct="1">
-        <a:defRPr sz="1350" kern="1200">
+      <a:lvl4pPr marL="982751" algn="l" defTabSz="655168" rtl="0" eaLnBrk="1" latinLnBrk="0" hangingPunct="1">
+        <a:defRPr sz="1290" kern="1200">
           <a:solidFill>
             <a:schemeClr val="tx1"/>
           </a:solidFill>
@@ -2894,8 +3023,8 @@
           <a:cs typeface="+mn-cs"/>
         </a:defRPr>
       </a:lvl4pPr>
-      <a:lvl5pPr marL="1371600" algn="l" defTabSz="685800" rtl="0" eaLnBrk="1" latinLnBrk="0" hangingPunct="1">
-        <a:defRPr sz="1350" kern="1200">
+      <a:lvl5pPr marL="1310335" algn="l" defTabSz="655168" rtl="0" eaLnBrk="1" latinLnBrk="0" hangingPunct="1">
+        <a:defRPr sz="1290" kern="1200">
           <a:solidFill>
             <a:schemeClr val="tx1"/>
           </a:solidFill>
@@ -2904,8 +3033,8 @@
           <a:cs typeface="+mn-cs"/>
         </a:defRPr>
       </a:lvl5pPr>
-      <a:lvl6pPr marL="1714500" algn="l" defTabSz="685800" rtl="0" eaLnBrk="1" latinLnBrk="0" hangingPunct="1">
-        <a:defRPr sz="1350" kern="1200">
+      <a:lvl6pPr marL="1637919" algn="l" defTabSz="655168" rtl="0" eaLnBrk="1" latinLnBrk="0" hangingPunct="1">
+        <a:defRPr sz="1290" kern="1200">
           <a:solidFill>
             <a:schemeClr val="tx1"/>
           </a:solidFill>
@@ -2914,8 +3043,8 @@
           <a:cs typeface="+mn-cs"/>
         </a:defRPr>
       </a:lvl6pPr>
-      <a:lvl7pPr marL="2057400" algn="l" defTabSz="685800" rtl="0" eaLnBrk="1" latinLnBrk="0" hangingPunct="1">
-        <a:defRPr sz="1350" kern="1200">
+      <a:lvl7pPr marL="1965503" algn="l" defTabSz="655168" rtl="0" eaLnBrk="1" latinLnBrk="0" hangingPunct="1">
+        <a:defRPr sz="1290" kern="1200">
           <a:solidFill>
             <a:schemeClr val="tx1"/>
           </a:solidFill>
@@ -2924,8 +3053,8 @@
           <a:cs typeface="+mn-cs"/>
         </a:defRPr>
       </a:lvl7pPr>
-      <a:lvl8pPr marL="2400300" algn="l" defTabSz="685800" rtl="0" eaLnBrk="1" latinLnBrk="0" hangingPunct="1">
-        <a:defRPr sz="1350" kern="1200">
+      <a:lvl8pPr marL="2293087" algn="l" defTabSz="655168" rtl="0" eaLnBrk="1" latinLnBrk="0" hangingPunct="1">
+        <a:defRPr sz="1290" kern="1200">
           <a:solidFill>
             <a:schemeClr val="tx1"/>
           </a:solidFill>
@@ -2934,8 +3063,8 @@
           <a:cs typeface="+mn-cs"/>
         </a:defRPr>
       </a:lvl8pPr>
-      <a:lvl9pPr marL="2743200" algn="l" defTabSz="685800" rtl="0" eaLnBrk="1" latinLnBrk="0" hangingPunct="1">
-        <a:defRPr sz="1350" kern="1200">
+      <a:lvl9pPr marL="2620670" algn="l" defTabSz="655168" rtl="0" eaLnBrk="1" latinLnBrk="0" hangingPunct="1">
+        <a:defRPr sz="1290" kern="1200">
           <a:solidFill>
             <a:schemeClr val="tx1"/>
           </a:solidFill>
@@ -2968,10 +3097,10 @@
       </p:grpSpPr>
       <p:pic>
         <p:nvPicPr>
-          <p:cNvPr id="21" name="Picture 20">
+          <p:cNvPr id="13" name="Picture 12" descr="A graph showing the amount of data&#10;&#10;Description automatically generated with medium confidence">
             <a:extLst>
               <a:ext uri="{FF2B5EF4-FFF2-40B4-BE49-F238E27FC236}">
-                <a16:creationId xmlns:a16="http://schemas.microsoft.com/office/drawing/2014/main" id="{FF456E24-FAEF-232F-2F76-BC64338E02CF}"/>
+                <a16:creationId xmlns:a16="http://schemas.microsoft.com/office/drawing/2014/main" id="{96717325-C6C3-30D6-398C-0D533D635D41}"/>
               </a:ext>
             </a:extLst>
           </p:cNvPr>
@@ -2981,14 +3110,20 @@
           <p:nvPr/>
         </p:nvPicPr>
         <p:blipFill rotWithShape="1">
-          <a:blip r:embed="rId2"/>
-          <a:srcRect l="43953" t="11642" r="27138" b="26628"/>
+          <a:blip r:embed="rId2">
+            <a:extLst>
+              <a:ext uri="{28A0092B-C50C-407E-A947-70E740481C1C}">
+                <a14:useLocalDpi xmlns:a14="http://schemas.microsoft.com/office/drawing/2010/main" val="0"/>
+              </a:ext>
+            </a:extLst>
+          </a:blip>
+          <a:srcRect l="7070" r="9441"/>
           <a:stretch/>
         </p:blipFill>
         <p:spPr>
           <a:xfrm>
-            <a:off x="3525256" y="3057722"/>
-            <a:ext cx="3240000" cy="2896163"/>
+            <a:off x="12273" y="7439"/>
+            <a:ext cx="3240000" cy="2967599"/>
           </a:xfrm>
           <a:prstGeom prst="rect">
             <a:avLst/>
@@ -2997,10 +3132,10 @@
       </p:pic>
       <p:pic>
         <p:nvPicPr>
-          <p:cNvPr id="22" name="Picture 21">
+          <p:cNvPr id="14" name="Picture 13" descr="A graph showing the amount of data&#10;&#10;Description automatically generated with medium confidence">
             <a:extLst>
               <a:ext uri="{FF2B5EF4-FFF2-40B4-BE49-F238E27FC236}">
-                <a16:creationId xmlns:a16="http://schemas.microsoft.com/office/drawing/2014/main" id="{1B34EC26-9B15-AD35-EA9B-EB76BC38BC66}"/>
+                <a16:creationId xmlns:a16="http://schemas.microsoft.com/office/drawing/2014/main" id="{AD73AE78-0E11-8170-49DB-A643BF1FC229}"/>
               </a:ext>
             </a:extLst>
           </p:cNvPr>
@@ -3010,14 +3145,20 @@
           <p:nvPr/>
         </p:nvPicPr>
         <p:blipFill rotWithShape="1">
-          <a:blip r:embed="rId3"/>
-          <a:srcRect l="43953" t="11642" r="27138" b="26628"/>
+          <a:blip r:embed="rId3">
+            <a:extLst>
+              <a:ext uri="{28A0092B-C50C-407E-A947-70E740481C1C}">
+                <a14:useLocalDpi xmlns:a14="http://schemas.microsoft.com/office/drawing/2010/main" val="0"/>
+              </a:ext>
+            </a:extLst>
+          </a:blip>
+          <a:srcRect l="7070" r="9441"/>
           <a:stretch/>
         </p:blipFill>
         <p:spPr>
           <a:xfrm>
-            <a:off x="96256" y="3057723"/>
-            <a:ext cx="3240000" cy="2896163"/>
+            <a:off x="3313930" y="7439"/>
+            <a:ext cx="3240000" cy="2967599"/>
           </a:xfrm>
           <a:prstGeom prst="rect">
             <a:avLst/>
@@ -3026,10 +3167,10 @@
       </p:pic>
       <p:pic>
         <p:nvPicPr>
-          <p:cNvPr id="23" name="Picture 22">
+          <p:cNvPr id="15" name="Picture 14" descr="A graph of different colored lines&#10;&#10;Description automatically generated with medium confidence">
             <a:extLst>
               <a:ext uri="{FF2B5EF4-FFF2-40B4-BE49-F238E27FC236}">
-                <a16:creationId xmlns:a16="http://schemas.microsoft.com/office/drawing/2014/main" id="{1DE6F4B4-FF13-EB11-A72A-1237F656624E}"/>
+                <a16:creationId xmlns:a16="http://schemas.microsoft.com/office/drawing/2014/main" id="{DDE7059B-CB3E-B84E-925C-6D1827ED6B30}"/>
               </a:ext>
             </a:extLst>
           </p:cNvPr>
@@ -3039,14 +3180,20 @@
           <p:nvPr/>
         </p:nvPicPr>
         <p:blipFill rotWithShape="1">
-          <a:blip r:embed="rId4"/>
-          <a:srcRect l="43953" t="11642" r="27138" b="26628"/>
+          <a:blip r:embed="rId4">
+            <a:extLst>
+              <a:ext uri="{28A0092B-C50C-407E-A947-70E740481C1C}">
+                <a14:useLocalDpi xmlns:a14="http://schemas.microsoft.com/office/drawing/2010/main" val="0"/>
+              </a:ext>
+            </a:extLst>
+          </a:blip>
+          <a:srcRect l="7070" r="9441"/>
           <a:stretch/>
         </p:blipFill>
         <p:spPr>
           <a:xfrm>
-            <a:off x="3525256" y="49828"/>
-            <a:ext cx="3240000" cy="2896163"/>
+            <a:off x="12273" y="3026801"/>
+            <a:ext cx="3240000" cy="2967599"/>
           </a:xfrm>
           <a:prstGeom prst="rect">
             <a:avLst/>
@@ -3055,10 +3202,10 @@
       </p:pic>
       <p:pic>
         <p:nvPicPr>
-          <p:cNvPr id="24" name="Picture 23">
+          <p:cNvPr id="16" name="Picture 15" descr="A graph showing the different types of data&#10;&#10;Description automatically generated with medium confidence">
             <a:extLst>
               <a:ext uri="{FF2B5EF4-FFF2-40B4-BE49-F238E27FC236}">
-                <a16:creationId xmlns:a16="http://schemas.microsoft.com/office/drawing/2014/main" id="{B76F05C9-51F2-AE55-FCCD-ECA6A5ACC9B3}"/>
+                <a16:creationId xmlns:a16="http://schemas.microsoft.com/office/drawing/2014/main" id="{2BA1BDC2-D55B-B980-D056-1C6D72928FF7}"/>
               </a:ext>
             </a:extLst>
           </p:cNvPr>
@@ -3068,14 +3215,20 @@
           <p:nvPr/>
         </p:nvPicPr>
         <p:blipFill rotWithShape="1">
-          <a:blip r:embed="rId5"/>
-          <a:srcRect l="43953" t="11642" r="27138" b="26628"/>
+          <a:blip r:embed="rId5">
+            <a:extLst>
+              <a:ext uri="{28A0092B-C50C-407E-A947-70E740481C1C}">
+                <a14:useLocalDpi xmlns:a14="http://schemas.microsoft.com/office/drawing/2010/main" val="0"/>
+              </a:ext>
+            </a:extLst>
+          </a:blip>
+          <a:srcRect l="7070" r="9441"/>
           <a:stretch/>
         </p:blipFill>
         <p:spPr>
           <a:xfrm>
-            <a:off x="96256" y="49829"/>
-            <a:ext cx="3240000" cy="2896163"/>
+            <a:off x="3313930" y="3026801"/>
+            <a:ext cx="3240000" cy="2967599"/>
           </a:xfrm>
           <a:prstGeom prst="rect">
             <a:avLst/>
@@ -3085,7 +3238,7 @@
     </p:spTree>
     <p:extLst>
       <p:ext uri="{BB962C8B-B14F-4D97-AF65-F5344CB8AC3E}">
-        <p14:creationId xmlns:p14="http://schemas.microsoft.com/office/powerpoint/2010/main" val="3018267397"/>
+        <p14:creationId xmlns:p14="http://schemas.microsoft.com/office/powerpoint/2010/main" val="1020928249"/>
       </p:ext>
     </p:extLst>
   </p:cSld>

</xml_diff>

<commit_message>
Added the new manuscript and the figures
</commit_message>
<xml_diff>
--- a/Manuscript/Figures/04_Results_AROC_AROCz.pptx
+++ b/Manuscript/Figures/04_Results_AROC_AROCz.pptx
@@ -2,12 +2,12 @@
 <file path=ppt/presentation.xml><?xml version="1.0" encoding="utf-8"?>
 <p:presentation xmlns:a="http://schemas.openxmlformats.org/drawingml/2006/main" xmlns:r="http://schemas.openxmlformats.org/officeDocument/2006/relationships" xmlns:p="http://schemas.openxmlformats.org/presentationml/2006/main" saveSubsetFonts="1">
   <p:sldMasterIdLst>
-    <p:sldMasterId id="2147483828" r:id="rId1"/>
+    <p:sldMasterId id="2147483876" r:id="rId1"/>
   </p:sldMasterIdLst>
   <p:sldIdLst>
     <p:sldId id="257" r:id="rId2"/>
   </p:sldIdLst>
-  <p:sldSz cx="6858000" cy="7110413"/>
+  <p:sldSz cx="6858000" cy="6840538"/>
   <p:notesSz cx="6858000" cy="9144000"/>
   <p:defaultTextStyle>
     <a:defPPr>
@@ -115,8 +115,7 @@
 <file path=ppt/revisionInfo.xml><?xml version="1.0" encoding="utf-8"?>
 <p1510:revInfo xmlns:a="http://schemas.openxmlformats.org/drawingml/2006/main" xmlns:r="http://schemas.openxmlformats.org/officeDocument/2006/relationships" xmlns:p1510="http://schemas.microsoft.com/office/powerpoint/2015/10/main">
   <p1510:revLst>
-    <p1510:client id="{50CD2DE6-90E1-4202-80B1-CEFAFC740B43}" v="8" dt="2023-09-12T22:08:53.175"/>
-    <p1510:client id="{DC98660D-F6E1-4194-B211-8B1AB1E2933D}" v="29" dt="2023-09-13T10:43:18.713"/>
+    <p1510:client id="{86C2B298-8E86-4393-93A2-CFE240007F7F}" v="9" dt="2023-12-13T11:06:28.832"/>
   </p1510:revLst>
 </p1510:revInfo>
 </file>
@@ -311,6 +310,414 @@
             <ac:spMk id="3" creationId="{E2B55A69-11A1-431F-10DF-4282787670B7}"/>
           </ac:spMkLst>
         </pc:spChg>
+      </pc:sldChg>
+    </pc:docChg>
+  </pc:docChgLst>
+  <pc:docChgLst>
+    <pc:chgData name="Fatima Pillosu" userId="a6295d4dc9e22643" providerId="LiveId" clId="{86C2B298-8E86-4393-93A2-CFE240007F7F}"/>
+    <pc:docChg chg="custSel modSld">
+      <pc:chgData name="Fatima Pillosu" userId="a6295d4dc9e22643" providerId="LiveId" clId="{86C2B298-8E86-4393-93A2-CFE240007F7F}" dt="2023-12-13T11:06:57.081" v="137" actId="1038"/>
+      <pc:docMkLst>
+        <pc:docMk/>
+      </pc:docMkLst>
+      <pc:sldChg chg="addSp delSp modSp mod">
+        <pc:chgData name="Fatima Pillosu" userId="a6295d4dc9e22643" providerId="LiveId" clId="{86C2B298-8E86-4393-93A2-CFE240007F7F}" dt="2023-12-13T11:06:57.081" v="137" actId="1038"/>
+        <pc:sldMkLst>
+          <pc:docMk/>
+          <pc:sldMk cId="1020928249" sldId="257"/>
+        </pc:sldMkLst>
+        <pc:spChg chg="add del mod">
+          <ac:chgData name="Fatima Pillosu" userId="a6295d4dc9e22643" providerId="LiveId" clId="{86C2B298-8E86-4393-93A2-CFE240007F7F}" dt="2023-12-13T11:05:40.281" v="110" actId="21"/>
+          <ac:spMkLst>
+            <pc:docMk/>
+            <pc:sldMk cId="1020928249" sldId="257"/>
+            <ac:spMk id="6" creationId="{ACE749DF-2BE2-0800-0987-C455C66BF855}"/>
+          </ac:spMkLst>
+        </pc:spChg>
+        <pc:spChg chg="add del mod">
+          <ac:chgData name="Fatima Pillosu" userId="a6295d4dc9e22643" providerId="LiveId" clId="{86C2B298-8E86-4393-93A2-CFE240007F7F}" dt="2023-12-13T11:05:40.281" v="110" actId="21"/>
+          <ac:spMkLst>
+            <pc:docMk/>
+            <pc:sldMk cId="1020928249" sldId="257"/>
+            <ac:spMk id="7" creationId="{3E725C13-990B-8BB3-52A1-572ACB62CD0D}"/>
+          </ac:spMkLst>
+        </pc:spChg>
+        <pc:spChg chg="add del mod">
+          <ac:chgData name="Fatima Pillosu" userId="a6295d4dc9e22643" providerId="LiveId" clId="{86C2B298-8E86-4393-93A2-CFE240007F7F}" dt="2023-12-13T11:05:40.281" v="110" actId="21"/>
+          <ac:spMkLst>
+            <pc:docMk/>
+            <pc:sldMk cId="1020928249" sldId="257"/>
+            <ac:spMk id="8" creationId="{02EFE3F0-799F-4387-AEFB-B7C828BBF6DB}"/>
+          </ac:spMkLst>
+        </pc:spChg>
+        <pc:spChg chg="add del mod">
+          <ac:chgData name="Fatima Pillosu" userId="a6295d4dc9e22643" providerId="LiveId" clId="{86C2B298-8E86-4393-93A2-CFE240007F7F}" dt="2023-12-13T11:05:40.281" v="110" actId="21"/>
+          <ac:spMkLst>
+            <pc:docMk/>
+            <pc:sldMk cId="1020928249" sldId="257"/>
+            <ac:spMk id="9" creationId="{A418B1B5-D82F-5A73-5AA9-8352D0F889D5}"/>
+          </ac:spMkLst>
+        </pc:spChg>
+        <pc:spChg chg="add del mod">
+          <ac:chgData name="Fatima Pillosu" userId="a6295d4dc9e22643" providerId="LiveId" clId="{86C2B298-8E86-4393-93A2-CFE240007F7F}" dt="2023-12-13T11:05:40.281" v="110" actId="21"/>
+          <ac:spMkLst>
+            <pc:docMk/>
+            <pc:sldMk cId="1020928249" sldId="257"/>
+            <ac:spMk id="11" creationId="{57AFEF21-4C67-12AA-F4D5-FFE43C779745}"/>
+          </ac:spMkLst>
+        </pc:spChg>
+        <pc:spChg chg="add del">
+          <ac:chgData name="Fatima Pillosu" userId="a6295d4dc9e22643" providerId="LiveId" clId="{86C2B298-8E86-4393-93A2-CFE240007F7F}" dt="2023-12-13T11:05:35.794" v="109" actId="478"/>
+          <ac:spMkLst>
+            <pc:docMk/>
+            <pc:sldMk cId="1020928249" sldId="257"/>
+            <ac:spMk id="12" creationId="{CECBED5A-FA9F-7BB5-D69E-450E29CD787E}"/>
+          </ac:spMkLst>
+        </pc:spChg>
+        <pc:spChg chg="add del mod">
+          <ac:chgData name="Fatima Pillosu" userId="a6295d4dc9e22643" providerId="LiveId" clId="{86C2B298-8E86-4393-93A2-CFE240007F7F}" dt="2023-12-13T11:06:02.658" v="112" actId="21"/>
+          <ac:spMkLst>
+            <pc:docMk/>
+            <pc:sldMk cId="1020928249" sldId="257"/>
+            <ac:spMk id="17" creationId="{9EA3473F-F620-DF69-1C56-04BD0A59DB9B}"/>
+          </ac:spMkLst>
+        </pc:spChg>
+        <pc:spChg chg="add del mod">
+          <ac:chgData name="Fatima Pillosu" userId="a6295d4dc9e22643" providerId="LiveId" clId="{86C2B298-8E86-4393-93A2-CFE240007F7F}" dt="2023-12-13T11:06:02.658" v="112" actId="21"/>
+          <ac:spMkLst>
+            <pc:docMk/>
+            <pc:sldMk cId="1020928249" sldId="257"/>
+            <ac:spMk id="18" creationId="{61F23B29-41BD-0895-87FE-F62B2DCC67F1}"/>
+          </ac:spMkLst>
+        </pc:spChg>
+        <pc:spChg chg="add del mod">
+          <ac:chgData name="Fatima Pillosu" userId="a6295d4dc9e22643" providerId="LiveId" clId="{86C2B298-8E86-4393-93A2-CFE240007F7F}" dt="2023-12-13T11:06:02.658" v="112" actId="21"/>
+          <ac:spMkLst>
+            <pc:docMk/>
+            <pc:sldMk cId="1020928249" sldId="257"/>
+            <ac:spMk id="19" creationId="{241D5E0B-9843-ED77-3892-C5BCED9CFA7D}"/>
+          </ac:spMkLst>
+        </pc:spChg>
+        <pc:spChg chg="add del mod">
+          <ac:chgData name="Fatima Pillosu" userId="a6295d4dc9e22643" providerId="LiveId" clId="{86C2B298-8E86-4393-93A2-CFE240007F7F}" dt="2023-12-13T11:06:02.658" v="112" actId="21"/>
+          <ac:spMkLst>
+            <pc:docMk/>
+            <pc:sldMk cId="1020928249" sldId="257"/>
+            <ac:spMk id="20" creationId="{FFDE5B99-D182-9E6E-CFE2-9EEB53CFB312}"/>
+          </ac:spMkLst>
+        </pc:spChg>
+        <pc:spChg chg="add del mod">
+          <ac:chgData name="Fatima Pillosu" userId="a6295d4dc9e22643" providerId="LiveId" clId="{86C2B298-8E86-4393-93A2-CFE240007F7F}" dt="2023-12-13T11:06:02.658" v="112" actId="21"/>
+          <ac:spMkLst>
+            <pc:docMk/>
+            <pc:sldMk cId="1020928249" sldId="257"/>
+            <ac:spMk id="22" creationId="{C5EC5D59-4C7E-92E5-36CF-AEAE8E66879C}"/>
+          </ac:spMkLst>
+        </pc:spChg>
+        <pc:spChg chg="add del mod">
+          <ac:chgData name="Fatima Pillosu" userId="a6295d4dc9e22643" providerId="LiveId" clId="{86C2B298-8E86-4393-93A2-CFE240007F7F}" dt="2023-12-13T11:06:20.732" v="114" actId="21"/>
+          <ac:spMkLst>
+            <pc:docMk/>
+            <pc:sldMk cId="1020928249" sldId="257"/>
+            <ac:spMk id="27" creationId="{CD0E8410-9FD2-202B-6FEE-5E022CF2F6F8}"/>
+          </ac:spMkLst>
+        </pc:spChg>
+        <pc:spChg chg="add del mod">
+          <ac:chgData name="Fatima Pillosu" userId="a6295d4dc9e22643" providerId="LiveId" clId="{86C2B298-8E86-4393-93A2-CFE240007F7F}" dt="2023-12-13T11:06:20.732" v="114" actId="21"/>
+          <ac:spMkLst>
+            <pc:docMk/>
+            <pc:sldMk cId="1020928249" sldId="257"/>
+            <ac:spMk id="28" creationId="{A6C0DDA4-0052-2C88-B0EC-03EE1A0E9672}"/>
+          </ac:spMkLst>
+        </pc:spChg>
+        <pc:spChg chg="add del mod">
+          <ac:chgData name="Fatima Pillosu" userId="a6295d4dc9e22643" providerId="LiveId" clId="{86C2B298-8E86-4393-93A2-CFE240007F7F}" dt="2023-12-13T11:06:20.732" v="114" actId="21"/>
+          <ac:spMkLst>
+            <pc:docMk/>
+            <pc:sldMk cId="1020928249" sldId="257"/>
+            <ac:spMk id="29" creationId="{C8E13C13-C30C-7FA4-862C-6CFAF378A9E8}"/>
+          </ac:spMkLst>
+        </pc:spChg>
+        <pc:spChg chg="add del mod">
+          <ac:chgData name="Fatima Pillosu" userId="a6295d4dc9e22643" providerId="LiveId" clId="{86C2B298-8E86-4393-93A2-CFE240007F7F}" dt="2023-12-13T11:06:20.732" v="114" actId="21"/>
+          <ac:spMkLst>
+            <pc:docMk/>
+            <pc:sldMk cId="1020928249" sldId="257"/>
+            <ac:spMk id="30" creationId="{09A073F3-2627-5F03-899E-34AA81F7D2C7}"/>
+          </ac:spMkLst>
+        </pc:spChg>
+        <pc:spChg chg="add del mod">
+          <ac:chgData name="Fatima Pillosu" userId="a6295d4dc9e22643" providerId="LiveId" clId="{86C2B298-8E86-4393-93A2-CFE240007F7F}" dt="2023-12-13T11:06:20.732" v="114" actId="21"/>
+          <ac:spMkLst>
+            <pc:docMk/>
+            <pc:sldMk cId="1020928249" sldId="257"/>
+            <ac:spMk id="32" creationId="{CD905C93-19A9-B856-F5F0-250BA7AEADAA}"/>
+          </ac:spMkLst>
+        </pc:spChg>
+        <pc:spChg chg="add mod">
+          <ac:chgData name="Fatima Pillosu" userId="a6295d4dc9e22643" providerId="LiveId" clId="{86C2B298-8E86-4393-93A2-CFE240007F7F}" dt="2023-12-13T11:06:50.300" v="131" actId="1037"/>
+          <ac:spMkLst>
+            <pc:docMk/>
+            <pc:sldMk cId="1020928249" sldId="257"/>
+            <ac:spMk id="37" creationId="{F9897ED5-2571-F97E-7AE0-66A1587B5521}"/>
+          </ac:spMkLst>
+        </pc:spChg>
+        <pc:spChg chg="add mod">
+          <ac:chgData name="Fatima Pillosu" userId="a6295d4dc9e22643" providerId="LiveId" clId="{86C2B298-8E86-4393-93A2-CFE240007F7F}" dt="2023-12-13T11:06:37.605" v="126" actId="1036"/>
+          <ac:spMkLst>
+            <pc:docMk/>
+            <pc:sldMk cId="1020928249" sldId="257"/>
+            <ac:spMk id="38" creationId="{8749D1A6-589E-299F-24DA-444CE935D70E}"/>
+          </ac:spMkLst>
+        </pc:spChg>
+        <pc:spChg chg="add mod">
+          <ac:chgData name="Fatima Pillosu" userId="a6295d4dc9e22643" providerId="LiveId" clId="{86C2B298-8E86-4393-93A2-CFE240007F7F}" dt="2023-12-13T11:06:50.300" v="131" actId="1037"/>
+          <ac:spMkLst>
+            <pc:docMk/>
+            <pc:sldMk cId="1020928249" sldId="257"/>
+            <ac:spMk id="39" creationId="{159AE6D1-FE61-9A8F-EB19-DB2AE4B8F7BB}"/>
+          </ac:spMkLst>
+        </pc:spChg>
+        <pc:spChg chg="add mod">
+          <ac:chgData name="Fatima Pillosu" userId="a6295d4dc9e22643" providerId="LiveId" clId="{86C2B298-8E86-4393-93A2-CFE240007F7F}" dt="2023-12-13T11:06:37.605" v="126" actId="1036"/>
+          <ac:spMkLst>
+            <pc:docMk/>
+            <pc:sldMk cId="1020928249" sldId="257"/>
+            <ac:spMk id="40" creationId="{45CC2908-031B-92BE-0853-D8F2BE1DE3E8}"/>
+          </ac:spMkLst>
+        </pc:spChg>
+        <pc:spChg chg="add mod">
+          <ac:chgData name="Fatima Pillosu" userId="a6295d4dc9e22643" providerId="LiveId" clId="{86C2B298-8E86-4393-93A2-CFE240007F7F}" dt="2023-12-13T11:06:57.081" v="137" actId="1038"/>
+          <ac:spMkLst>
+            <pc:docMk/>
+            <pc:sldMk cId="1020928249" sldId="257"/>
+            <ac:spMk id="42" creationId="{29B3FAC5-7BBD-C3BB-6D6C-F39F2E256B03}"/>
+          </ac:spMkLst>
+        </pc:spChg>
+        <pc:spChg chg="del">
+          <ac:chgData name="Fatima Pillosu" userId="a6295d4dc9e22643" providerId="LiveId" clId="{86C2B298-8E86-4393-93A2-CFE240007F7F}" dt="2023-12-13T11:02:57.808" v="0" actId="21"/>
+          <ac:spMkLst>
+            <pc:docMk/>
+            <pc:sldMk cId="1020928249" sldId="257"/>
+            <ac:spMk id="82" creationId="{05EBDABA-E63E-DDCA-7A6E-B2A916983831}"/>
+          </ac:spMkLst>
+        </pc:spChg>
+        <pc:spChg chg="del">
+          <ac:chgData name="Fatima Pillosu" userId="a6295d4dc9e22643" providerId="LiveId" clId="{86C2B298-8E86-4393-93A2-CFE240007F7F}" dt="2023-12-13T11:02:57.808" v="0" actId="21"/>
+          <ac:spMkLst>
+            <pc:docMk/>
+            <pc:sldMk cId="1020928249" sldId="257"/>
+            <ac:spMk id="83" creationId="{401B5D69-27B6-A4C4-5E70-01CFE9276114}"/>
+          </ac:spMkLst>
+        </pc:spChg>
+        <pc:spChg chg="del">
+          <ac:chgData name="Fatima Pillosu" userId="a6295d4dc9e22643" providerId="LiveId" clId="{86C2B298-8E86-4393-93A2-CFE240007F7F}" dt="2023-12-13T11:02:57.808" v="0" actId="21"/>
+          <ac:spMkLst>
+            <pc:docMk/>
+            <pc:sldMk cId="1020928249" sldId="257"/>
+            <ac:spMk id="84" creationId="{6A4CBD19-AD51-3518-DA4C-90CCA09FDBD6}"/>
+          </ac:spMkLst>
+        </pc:spChg>
+        <pc:spChg chg="del">
+          <ac:chgData name="Fatima Pillosu" userId="a6295d4dc9e22643" providerId="LiveId" clId="{86C2B298-8E86-4393-93A2-CFE240007F7F}" dt="2023-12-13T11:02:57.808" v="0" actId="21"/>
+          <ac:spMkLst>
+            <pc:docMk/>
+            <pc:sldMk cId="1020928249" sldId="257"/>
+            <ac:spMk id="85" creationId="{AE743FFB-11E9-765E-E879-C0D6F59F0A1B}"/>
+          </ac:spMkLst>
+        </pc:spChg>
+        <pc:picChg chg="add del mod">
+          <ac:chgData name="Fatima Pillosu" userId="a6295d4dc9e22643" providerId="LiveId" clId="{86C2B298-8E86-4393-93A2-CFE240007F7F}" dt="2023-12-13T11:05:40.281" v="110" actId="21"/>
+          <ac:picMkLst>
+            <pc:docMk/>
+            <pc:sldMk cId="1020928249" sldId="257"/>
+            <ac:picMk id="2" creationId="{4E19FF35-CBE8-BE9E-9184-24F5B823BFB8}"/>
+          </ac:picMkLst>
+        </pc:picChg>
+        <pc:picChg chg="add del mod">
+          <ac:chgData name="Fatima Pillosu" userId="a6295d4dc9e22643" providerId="LiveId" clId="{86C2B298-8E86-4393-93A2-CFE240007F7F}" dt="2023-12-13T11:05:40.281" v="110" actId="21"/>
+          <ac:picMkLst>
+            <pc:docMk/>
+            <pc:sldMk cId="1020928249" sldId="257"/>
+            <ac:picMk id="3" creationId="{92B8A48F-F3D3-C34E-1B43-49CA973308FA}"/>
+          </ac:picMkLst>
+        </pc:picChg>
+        <pc:picChg chg="add del mod">
+          <ac:chgData name="Fatima Pillosu" userId="a6295d4dc9e22643" providerId="LiveId" clId="{86C2B298-8E86-4393-93A2-CFE240007F7F}" dt="2023-12-13T11:05:40.281" v="110" actId="21"/>
+          <ac:picMkLst>
+            <pc:docMk/>
+            <pc:sldMk cId="1020928249" sldId="257"/>
+            <ac:picMk id="4" creationId="{F471FF92-7B4B-8A68-EF32-0A183E44C2EC}"/>
+          </ac:picMkLst>
+        </pc:picChg>
+        <pc:picChg chg="add del mod">
+          <ac:chgData name="Fatima Pillosu" userId="a6295d4dc9e22643" providerId="LiveId" clId="{86C2B298-8E86-4393-93A2-CFE240007F7F}" dt="2023-12-13T11:05:40.281" v="110" actId="21"/>
+          <ac:picMkLst>
+            <pc:docMk/>
+            <pc:sldMk cId="1020928249" sldId="257"/>
+            <ac:picMk id="5" creationId="{0822137D-3E98-004D-7B4B-3EF96A8E2939}"/>
+          </ac:picMkLst>
+        </pc:picChg>
+        <pc:picChg chg="add del mod">
+          <ac:chgData name="Fatima Pillosu" userId="a6295d4dc9e22643" providerId="LiveId" clId="{86C2B298-8E86-4393-93A2-CFE240007F7F}" dt="2023-12-13T11:06:02.658" v="112" actId="21"/>
+          <ac:picMkLst>
+            <pc:docMk/>
+            <pc:sldMk cId="1020928249" sldId="257"/>
+            <ac:picMk id="13" creationId="{705D043D-03DD-91CB-78B6-66BF53F8A961}"/>
+          </ac:picMkLst>
+        </pc:picChg>
+        <pc:picChg chg="add del mod">
+          <ac:chgData name="Fatima Pillosu" userId="a6295d4dc9e22643" providerId="LiveId" clId="{86C2B298-8E86-4393-93A2-CFE240007F7F}" dt="2023-12-13T11:06:02.658" v="112" actId="21"/>
+          <ac:picMkLst>
+            <pc:docMk/>
+            <pc:sldMk cId="1020928249" sldId="257"/>
+            <ac:picMk id="14" creationId="{9D5CDF1B-F816-B8BF-3B81-080498F0B12A}"/>
+          </ac:picMkLst>
+        </pc:picChg>
+        <pc:picChg chg="add del mod">
+          <ac:chgData name="Fatima Pillosu" userId="a6295d4dc9e22643" providerId="LiveId" clId="{86C2B298-8E86-4393-93A2-CFE240007F7F}" dt="2023-12-13T11:06:02.658" v="112" actId="21"/>
+          <ac:picMkLst>
+            <pc:docMk/>
+            <pc:sldMk cId="1020928249" sldId="257"/>
+            <ac:picMk id="15" creationId="{16601B32-BD1C-9398-8ACD-755F969DC995}"/>
+          </ac:picMkLst>
+        </pc:picChg>
+        <pc:picChg chg="add del mod">
+          <ac:chgData name="Fatima Pillosu" userId="a6295d4dc9e22643" providerId="LiveId" clId="{86C2B298-8E86-4393-93A2-CFE240007F7F}" dt="2023-12-13T11:06:02.658" v="112" actId="21"/>
+          <ac:picMkLst>
+            <pc:docMk/>
+            <pc:sldMk cId="1020928249" sldId="257"/>
+            <ac:picMk id="16" creationId="{573506FC-70E3-474A-5869-BBA12AF501F1}"/>
+          </ac:picMkLst>
+        </pc:picChg>
+        <pc:picChg chg="add del mod">
+          <ac:chgData name="Fatima Pillosu" userId="a6295d4dc9e22643" providerId="LiveId" clId="{86C2B298-8E86-4393-93A2-CFE240007F7F}" dt="2023-12-13T11:06:20.732" v="114" actId="21"/>
+          <ac:picMkLst>
+            <pc:docMk/>
+            <pc:sldMk cId="1020928249" sldId="257"/>
+            <ac:picMk id="23" creationId="{563808AD-16B0-33ED-5200-A330B26A5421}"/>
+          </ac:picMkLst>
+        </pc:picChg>
+        <pc:picChg chg="add del mod">
+          <ac:chgData name="Fatima Pillosu" userId="a6295d4dc9e22643" providerId="LiveId" clId="{86C2B298-8E86-4393-93A2-CFE240007F7F}" dt="2023-12-13T11:06:20.732" v="114" actId="21"/>
+          <ac:picMkLst>
+            <pc:docMk/>
+            <pc:sldMk cId="1020928249" sldId="257"/>
+            <ac:picMk id="24" creationId="{25CD06D4-E939-2269-A6B3-1A0ECD77C5ED}"/>
+          </ac:picMkLst>
+        </pc:picChg>
+        <pc:picChg chg="add del mod">
+          <ac:chgData name="Fatima Pillosu" userId="a6295d4dc9e22643" providerId="LiveId" clId="{86C2B298-8E86-4393-93A2-CFE240007F7F}" dt="2023-12-13T11:06:20.732" v="114" actId="21"/>
+          <ac:picMkLst>
+            <pc:docMk/>
+            <pc:sldMk cId="1020928249" sldId="257"/>
+            <ac:picMk id="25" creationId="{C204DF07-0E3D-8633-29F9-44DE7A6E34B8}"/>
+          </ac:picMkLst>
+        </pc:picChg>
+        <pc:picChg chg="add del mod">
+          <ac:chgData name="Fatima Pillosu" userId="a6295d4dc9e22643" providerId="LiveId" clId="{86C2B298-8E86-4393-93A2-CFE240007F7F}" dt="2023-12-13T11:06:20.732" v="114" actId="21"/>
+          <ac:picMkLst>
+            <pc:docMk/>
+            <pc:sldMk cId="1020928249" sldId="257"/>
+            <ac:picMk id="26" creationId="{D90DBC29-9B2E-FD65-7D09-DB55D2D205E6}"/>
+          </ac:picMkLst>
+        </pc:picChg>
+        <pc:picChg chg="add mod">
+          <ac:chgData name="Fatima Pillosu" userId="a6295d4dc9e22643" providerId="LiveId" clId="{86C2B298-8E86-4393-93A2-CFE240007F7F}" dt="2023-12-13T11:06:50.300" v="131" actId="1037"/>
+          <ac:picMkLst>
+            <pc:docMk/>
+            <pc:sldMk cId="1020928249" sldId="257"/>
+            <ac:picMk id="33" creationId="{144B217B-CE0B-2BEC-8D53-4A2E020E1AB2}"/>
+          </ac:picMkLst>
+        </pc:picChg>
+        <pc:picChg chg="add mod">
+          <ac:chgData name="Fatima Pillosu" userId="a6295d4dc9e22643" providerId="LiveId" clId="{86C2B298-8E86-4393-93A2-CFE240007F7F}" dt="2023-12-13T11:06:37.605" v="126" actId="1036"/>
+          <ac:picMkLst>
+            <pc:docMk/>
+            <pc:sldMk cId="1020928249" sldId="257"/>
+            <ac:picMk id="34" creationId="{641BFE02-22A9-3EDD-DED7-1EBCA3ABA035}"/>
+          </ac:picMkLst>
+        </pc:picChg>
+        <pc:picChg chg="add mod">
+          <ac:chgData name="Fatima Pillosu" userId="a6295d4dc9e22643" providerId="LiveId" clId="{86C2B298-8E86-4393-93A2-CFE240007F7F}" dt="2023-12-13T11:06:50.300" v="131" actId="1037"/>
+          <ac:picMkLst>
+            <pc:docMk/>
+            <pc:sldMk cId="1020928249" sldId="257"/>
+            <ac:picMk id="35" creationId="{CB88D001-5149-93FE-EAF3-B74D88C1C902}"/>
+          </ac:picMkLst>
+        </pc:picChg>
+        <pc:picChg chg="add mod">
+          <ac:chgData name="Fatima Pillosu" userId="a6295d4dc9e22643" providerId="LiveId" clId="{86C2B298-8E86-4393-93A2-CFE240007F7F}" dt="2023-12-13T11:06:37.605" v="126" actId="1036"/>
+          <ac:picMkLst>
+            <pc:docMk/>
+            <pc:sldMk cId="1020928249" sldId="257"/>
+            <ac:picMk id="36" creationId="{B9C13A36-EF37-B47C-DB6C-F8D843034491}"/>
+          </ac:picMkLst>
+        </pc:picChg>
+        <pc:picChg chg="del">
+          <ac:chgData name="Fatima Pillosu" userId="a6295d4dc9e22643" providerId="LiveId" clId="{86C2B298-8E86-4393-93A2-CFE240007F7F}" dt="2023-12-13T11:02:57.808" v="0" actId="21"/>
+          <ac:picMkLst>
+            <pc:docMk/>
+            <pc:sldMk cId="1020928249" sldId="257"/>
+            <ac:picMk id="87" creationId="{12808E4F-A0CC-1CD9-6BE7-CDA4662210C6}"/>
+          </ac:picMkLst>
+        </pc:picChg>
+        <pc:picChg chg="del">
+          <ac:chgData name="Fatima Pillosu" userId="a6295d4dc9e22643" providerId="LiveId" clId="{86C2B298-8E86-4393-93A2-CFE240007F7F}" dt="2023-12-13T11:02:57.808" v="0" actId="21"/>
+          <ac:picMkLst>
+            <pc:docMk/>
+            <pc:sldMk cId="1020928249" sldId="257"/>
+            <ac:picMk id="89" creationId="{C1800E25-D524-C873-6466-6A21BA6B66F7}"/>
+          </ac:picMkLst>
+        </pc:picChg>
+        <pc:picChg chg="del">
+          <ac:chgData name="Fatima Pillosu" userId="a6295d4dc9e22643" providerId="LiveId" clId="{86C2B298-8E86-4393-93A2-CFE240007F7F}" dt="2023-12-13T11:02:57.808" v="0" actId="21"/>
+          <ac:picMkLst>
+            <pc:docMk/>
+            <pc:sldMk cId="1020928249" sldId="257"/>
+            <ac:picMk id="91" creationId="{E24B2AE6-2F6E-5C96-14FB-B319013E414E}"/>
+          </ac:picMkLst>
+        </pc:picChg>
+        <pc:picChg chg="del">
+          <ac:chgData name="Fatima Pillosu" userId="a6295d4dc9e22643" providerId="LiveId" clId="{86C2B298-8E86-4393-93A2-CFE240007F7F}" dt="2023-12-13T11:02:57.808" v="0" actId="21"/>
+          <ac:picMkLst>
+            <pc:docMk/>
+            <pc:sldMk cId="1020928249" sldId="257"/>
+            <ac:picMk id="93" creationId="{2A3BB1FA-7039-19B9-7CFA-C7424DD91356}"/>
+          </ac:picMkLst>
+        </pc:picChg>
+        <pc:cxnChg chg="add del mod">
+          <ac:chgData name="Fatima Pillosu" userId="a6295d4dc9e22643" providerId="LiveId" clId="{86C2B298-8E86-4393-93A2-CFE240007F7F}" dt="2023-12-13T11:05:40.281" v="110" actId="21"/>
+          <ac:cxnSpMkLst>
+            <pc:docMk/>
+            <pc:sldMk cId="1020928249" sldId="257"/>
+            <ac:cxnSpMk id="10" creationId="{AD336E70-8B20-C8E6-57E7-8025D41096FF}"/>
+          </ac:cxnSpMkLst>
+        </pc:cxnChg>
+        <pc:cxnChg chg="add del mod">
+          <ac:chgData name="Fatima Pillosu" userId="a6295d4dc9e22643" providerId="LiveId" clId="{86C2B298-8E86-4393-93A2-CFE240007F7F}" dt="2023-12-13T11:06:02.658" v="112" actId="21"/>
+          <ac:cxnSpMkLst>
+            <pc:docMk/>
+            <pc:sldMk cId="1020928249" sldId="257"/>
+            <ac:cxnSpMk id="21" creationId="{CE7CFD45-C397-781C-7848-FCCDE101518E}"/>
+          </ac:cxnSpMkLst>
+        </pc:cxnChg>
+        <pc:cxnChg chg="add del mod">
+          <ac:chgData name="Fatima Pillosu" userId="a6295d4dc9e22643" providerId="LiveId" clId="{86C2B298-8E86-4393-93A2-CFE240007F7F}" dt="2023-12-13T11:06:20.732" v="114" actId="21"/>
+          <ac:cxnSpMkLst>
+            <pc:docMk/>
+            <pc:sldMk cId="1020928249" sldId="257"/>
+            <ac:cxnSpMk id="31" creationId="{56F6DA56-E7BA-0745-FF31-9C5EB12C9C38}"/>
+          </ac:cxnSpMkLst>
+        </pc:cxnChg>
+        <pc:cxnChg chg="add mod">
+          <ac:chgData name="Fatima Pillosu" userId="a6295d4dc9e22643" providerId="LiveId" clId="{86C2B298-8E86-4393-93A2-CFE240007F7F}" dt="2023-12-13T11:06:57.081" v="137" actId="1038"/>
+          <ac:cxnSpMkLst>
+            <pc:docMk/>
+            <pc:sldMk cId="1020928249" sldId="257"/>
+            <ac:cxnSpMk id="41" creationId="{B4C043E9-3489-91AF-F4DB-FD0645AEFF00}"/>
+          </ac:cxnSpMkLst>
+        </pc:cxnChg>
       </pc:sldChg>
     </pc:docChg>
   </pc:docChgLst>
@@ -1168,8 +1575,8 @@
         </p:nvSpPr>
         <p:spPr>
           <a:xfrm>
-            <a:off x="514350" y="1163672"/>
-            <a:ext cx="5829300" cy="2475477"/>
+            <a:off x="514350" y="1119505"/>
+            <a:ext cx="5829300" cy="2381521"/>
           </a:xfrm>
         </p:spPr>
         <p:txBody>
@@ -1200,8 +1607,8 @@
         </p:nvSpPr>
         <p:spPr>
           <a:xfrm>
-            <a:off x="857250" y="3734613"/>
-            <a:ext cx="5143500" cy="1716703"/>
+            <a:off x="857250" y="3592866"/>
+            <a:ext cx="5143500" cy="1651546"/>
           </a:xfrm>
         </p:spPr>
         <p:txBody>
@@ -1270,7 +1677,7 @@
           <a:p>
             <a:fld id="{7DA630C9-F8A3-479A-9A07-CCE6BDA0FBFA}" type="datetimeFigureOut">
               <a:rPr lang="en-GB" smtClean="0"/>
-              <a:t>13/09/2023</a:t>
+              <a:t>13/12/2023</a:t>
             </a:fld>
             <a:endParaRPr lang="en-GB"/>
           </a:p>
@@ -1321,7 +1728,7 @@
     </p:spTree>
     <p:extLst>
       <p:ext uri="{BB962C8B-B14F-4D97-AF65-F5344CB8AC3E}">
-        <p14:creationId xmlns:p14="http://schemas.microsoft.com/office/powerpoint/2010/main" val="4179584037"/>
+        <p14:creationId xmlns:p14="http://schemas.microsoft.com/office/powerpoint/2010/main" val="722271063"/>
       </p:ext>
     </p:extLst>
   </p:cSld>
@@ -1440,7 +1847,7 @@
           <a:p>
             <a:fld id="{7DA630C9-F8A3-479A-9A07-CCE6BDA0FBFA}" type="datetimeFigureOut">
               <a:rPr lang="en-GB" smtClean="0"/>
-              <a:t>13/09/2023</a:t>
+              <a:t>13/12/2023</a:t>
             </a:fld>
             <a:endParaRPr lang="en-GB"/>
           </a:p>
@@ -1491,7 +1898,7 @@
     </p:spTree>
     <p:extLst>
       <p:ext uri="{BB962C8B-B14F-4D97-AF65-F5344CB8AC3E}">
-        <p14:creationId xmlns:p14="http://schemas.microsoft.com/office/powerpoint/2010/main" val="2074474802"/>
+        <p14:creationId xmlns:p14="http://schemas.microsoft.com/office/powerpoint/2010/main" val="328667577"/>
       </p:ext>
     </p:extLst>
   </p:cSld>
@@ -1530,8 +1937,8 @@
         </p:nvSpPr>
         <p:spPr>
           <a:xfrm>
-            <a:off x="4907757" y="378564"/>
-            <a:ext cx="1478756" cy="6025746"/>
+            <a:off x="4907757" y="364195"/>
+            <a:ext cx="1478756" cy="5797040"/>
           </a:xfrm>
         </p:spPr>
         <p:txBody>
@@ -1558,8 +1965,8 @@
         </p:nvSpPr>
         <p:spPr>
           <a:xfrm>
-            <a:off x="471488" y="378564"/>
-            <a:ext cx="4350544" cy="6025746"/>
+            <a:off x="471488" y="364195"/>
+            <a:ext cx="4350544" cy="5797040"/>
           </a:xfrm>
         </p:spPr>
         <p:txBody>
@@ -1620,7 +2027,7 @@
           <a:p>
             <a:fld id="{7DA630C9-F8A3-479A-9A07-CCE6BDA0FBFA}" type="datetimeFigureOut">
               <a:rPr lang="en-GB" smtClean="0"/>
-              <a:t>13/09/2023</a:t>
+              <a:t>13/12/2023</a:t>
             </a:fld>
             <a:endParaRPr lang="en-GB"/>
           </a:p>
@@ -1671,7 +2078,7 @@
     </p:spTree>
     <p:extLst>
       <p:ext uri="{BB962C8B-B14F-4D97-AF65-F5344CB8AC3E}">
-        <p14:creationId xmlns:p14="http://schemas.microsoft.com/office/powerpoint/2010/main" val="397918936"/>
+        <p14:creationId xmlns:p14="http://schemas.microsoft.com/office/powerpoint/2010/main" val="3145019215"/>
       </p:ext>
     </p:extLst>
   </p:cSld>
@@ -1790,7 +2197,7 @@
           <a:p>
             <a:fld id="{7DA630C9-F8A3-479A-9A07-CCE6BDA0FBFA}" type="datetimeFigureOut">
               <a:rPr lang="en-GB" smtClean="0"/>
-              <a:t>13/09/2023</a:t>
+              <a:t>13/12/2023</a:t>
             </a:fld>
             <a:endParaRPr lang="en-GB"/>
           </a:p>
@@ -1841,7 +2248,7 @@
     </p:spTree>
     <p:extLst>
       <p:ext uri="{BB962C8B-B14F-4D97-AF65-F5344CB8AC3E}">
-        <p14:creationId xmlns:p14="http://schemas.microsoft.com/office/powerpoint/2010/main" val="4258516430"/>
+        <p14:creationId xmlns:p14="http://schemas.microsoft.com/office/powerpoint/2010/main" val="1494332947"/>
       </p:ext>
     </p:extLst>
   </p:cSld>
@@ -1880,8 +2287,8 @@
         </p:nvSpPr>
         <p:spPr>
           <a:xfrm>
-            <a:off x="467916" y="1772667"/>
-            <a:ext cx="5915025" cy="2957734"/>
+            <a:off x="467916" y="1705386"/>
+            <a:ext cx="5915025" cy="2845473"/>
           </a:xfrm>
         </p:spPr>
         <p:txBody>
@@ -1912,8 +2319,8 @@
         </p:nvSpPr>
         <p:spPr>
           <a:xfrm>
-            <a:off x="467916" y="4758383"/>
-            <a:ext cx="5915025" cy="1555402"/>
+            <a:off x="467916" y="4577779"/>
+            <a:ext cx="5915025" cy="1496367"/>
           </a:xfrm>
         </p:spPr>
         <p:txBody>
@@ -2034,7 +2441,7 @@
           <a:p>
             <a:fld id="{7DA630C9-F8A3-479A-9A07-CCE6BDA0FBFA}" type="datetimeFigureOut">
               <a:rPr lang="en-GB" smtClean="0"/>
-              <a:t>13/09/2023</a:t>
+              <a:t>13/12/2023</a:t>
             </a:fld>
             <a:endParaRPr lang="en-GB"/>
           </a:p>
@@ -2085,7 +2492,7 @@
     </p:spTree>
     <p:extLst>
       <p:ext uri="{BB962C8B-B14F-4D97-AF65-F5344CB8AC3E}">
-        <p14:creationId xmlns:p14="http://schemas.microsoft.com/office/powerpoint/2010/main" val="3827362918"/>
+        <p14:creationId xmlns:p14="http://schemas.microsoft.com/office/powerpoint/2010/main" val="2619819688"/>
       </p:ext>
     </p:extLst>
   </p:cSld>
@@ -2147,8 +2554,8 @@
         </p:nvSpPr>
         <p:spPr>
           <a:xfrm>
-            <a:off x="471488" y="1892818"/>
-            <a:ext cx="2914650" cy="4511492"/>
+            <a:off x="471488" y="1820976"/>
+            <a:ext cx="2914650" cy="4340259"/>
           </a:xfrm>
         </p:spPr>
         <p:txBody>
@@ -2204,8 +2611,8 @@
         </p:nvSpPr>
         <p:spPr>
           <a:xfrm>
-            <a:off x="3471863" y="1892818"/>
-            <a:ext cx="2914650" cy="4511492"/>
+            <a:off x="3471863" y="1820976"/>
+            <a:ext cx="2914650" cy="4340259"/>
           </a:xfrm>
         </p:spPr>
         <p:txBody>
@@ -2266,7 +2673,7 @@
           <a:p>
             <a:fld id="{7DA630C9-F8A3-479A-9A07-CCE6BDA0FBFA}" type="datetimeFigureOut">
               <a:rPr lang="en-GB" smtClean="0"/>
-              <a:t>13/09/2023</a:t>
+              <a:t>13/12/2023</a:t>
             </a:fld>
             <a:endParaRPr lang="en-GB"/>
           </a:p>
@@ -2317,7 +2724,7 @@
     </p:spTree>
     <p:extLst>
       <p:ext uri="{BB962C8B-B14F-4D97-AF65-F5344CB8AC3E}">
-        <p14:creationId xmlns:p14="http://schemas.microsoft.com/office/powerpoint/2010/main" val="2461334650"/>
+        <p14:creationId xmlns:p14="http://schemas.microsoft.com/office/powerpoint/2010/main" val="3512878909"/>
       </p:ext>
     </p:extLst>
   </p:cSld>
@@ -2356,8 +2763,8 @@
         </p:nvSpPr>
         <p:spPr>
           <a:xfrm>
-            <a:off x="472381" y="378565"/>
-            <a:ext cx="5915025" cy="1374351"/>
+            <a:off x="472381" y="364197"/>
+            <a:ext cx="5915025" cy="1322188"/>
           </a:xfrm>
         </p:spPr>
         <p:txBody>
@@ -2384,8 +2791,8 @@
         </p:nvSpPr>
         <p:spPr>
           <a:xfrm>
-            <a:off x="472381" y="1743039"/>
-            <a:ext cx="2901255" cy="854237"/>
+            <a:off x="472381" y="1676882"/>
+            <a:ext cx="2901255" cy="821814"/>
           </a:xfrm>
         </p:spPr>
         <p:txBody>
@@ -2449,8 +2856,8 @@
         </p:nvSpPr>
         <p:spPr>
           <a:xfrm>
-            <a:off x="472381" y="2597276"/>
-            <a:ext cx="2901255" cy="3820202"/>
+            <a:off x="472381" y="2498697"/>
+            <a:ext cx="2901255" cy="3675206"/>
           </a:xfrm>
         </p:spPr>
         <p:txBody>
@@ -2506,8 +2913,8 @@
         </p:nvSpPr>
         <p:spPr>
           <a:xfrm>
-            <a:off x="3471863" y="1743039"/>
-            <a:ext cx="2915543" cy="854237"/>
+            <a:off x="3471863" y="1676882"/>
+            <a:ext cx="2915543" cy="821814"/>
           </a:xfrm>
         </p:spPr>
         <p:txBody>
@@ -2571,8 +2978,8 @@
         </p:nvSpPr>
         <p:spPr>
           <a:xfrm>
-            <a:off x="3471863" y="2597276"/>
-            <a:ext cx="2915543" cy="3820202"/>
+            <a:off x="3471863" y="2498697"/>
+            <a:ext cx="2915543" cy="3675206"/>
           </a:xfrm>
         </p:spPr>
         <p:txBody>
@@ -2633,7 +3040,7 @@
           <a:p>
             <a:fld id="{7DA630C9-F8A3-479A-9A07-CCE6BDA0FBFA}" type="datetimeFigureOut">
               <a:rPr lang="en-GB" smtClean="0"/>
-              <a:t>13/09/2023</a:t>
+              <a:t>13/12/2023</a:t>
             </a:fld>
             <a:endParaRPr lang="en-GB"/>
           </a:p>
@@ -2684,7 +3091,7 @@
     </p:spTree>
     <p:extLst>
       <p:ext uri="{BB962C8B-B14F-4D97-AF65-F5344CB8AC3E}">
-        <p14:creationId xmlns:p14="http://schemas.microsoft.com/office/powerpoint/2010/main" val="1595022616"/>
+        <p14:creationId xmlns:p14="http://schemas.microsoft.com/office/powerpoint/2010/main" val="1597521685"/>
       </p:ext>
     </p:extLst>
   </p:cSld>
@@ -2751,7 +3158,7 @@
           <a:p>
             <a:fld id="{7DA630C9-F8A3-479A-9A07-CCE6BDA0FBFA}" type="datetimeFigureOut">
               <a:rPr lang="en-GB" smtClean="0"/>
-              <a:t>13/09/2023</a:t>
+              <a:t>13/12/2023</a:t>
             </a:fld>
             <a:endParaRPr lang="en-GB"/>
           </a:p>
@@ -2802,7 +3209,7 @@
     </p:spTree>
     <p:extLst>
       <p:ext uri="{BB962C8B-B14F-4D97-AF65-F5344CB8AC3E}">
-        <p14:creationId xmlns:p14="http://schemas.microsoft.com/office/powerpoint/2010/main" val="1819339190"/>
+        <p14:creationId xmlns:p14="http://schemas.microsoft.com/office/powerpoint/2010/main" val="2195912111"/>
       </p:ext>
     </p:extLst>
   </p:cSld>
@@ -2846,7 +3253,7 @@
           <a:p>
             <a:fld id="{7DA630C9-F8A3-479A-9A07-CCE6BDA0FBFA}" type="datetimeFigureOut">
               <a:rPr lang="en-GB" smtClean="0"/>
-              <a:t>13/09/2023</a:t>
+              <a:t>13/12/2023</a:t>
             </a:fld>
             <a:endParaRPr lang="en-GB"/>
           </a:p>
@@ -2897,7 +3304,7 @@
     </p:spTree>
     <p:extLst>
       <p:ext uri="{BB962C8B-B14F-4D97-AF65-F5344CB8AC3E}">
-        <p14:creationId xmlns:p14="http://schemas.microsoft.com/office/powerpoint/2010/main" val="56785277"/>
+        <p14:creationId xmlns:p14="http://schemas.microsoft.com/office/powerpoint/2010/main" val="1987728091"/>
       </p:ext>
     </p:extLst>
   </p:cSld>
@@ -2936,8 +3343,8 @@
         </p:nvSpPr>
         <p:spPr>
           <a:xfrm>
-            <a:off x="472381" y="474028"/>
-            <a:ext cx="2211884" cy="1659096"/>
+            <a:off x="472381" y="456036"/>
+            <a:ext cx="2211884" cy="1596126"/>
           </a:xfrm>
         </p:spPr>
         <p:txBody>
@@ -2968,8 +3375,8 @@
         </p:nvSpPr>
         <p:spPr>
           <a:xfrm>
-            <a:off x="2915543" y="1023769"/>
-            <a:ext cx="3471863" cy="5053002"/>
+            <a:off x="2915543" y="984912"/>
+            <a:ext cx="3471863" cy="4861216"/>
           </a:xfrm>
         </p:spPr>
         <p:txBody>
@@ -3053,8 +3460,8 @@
         </p:nvSpPr>
         <p:spPr>
           <a:xfrm>
-            <a:off x="472381" y="2133124"/>
-            <a:ext cx="2211884" cy="3951876"/>
+            <a:off x="472381" y="2052161"/>
+            <a:ext cx="2211884" cy="3801883"/>
           </a:xfrm>
         </p:spPr>
         <p:txBody>
@@ -3123,7 +3530,7 @@
           <a:p>
             <a:fld id="{7DA630C9-F8A3-479A-9A07-CCE6BDA0FBFA}" type="datetimeFigureOut">
               <a:rPr lang="en-GB" smtClean="0"/>
-              <a:t>13/09/2023</a:t>
+              <a:t>13/12/2023</a:t>
             </a:fld>
             <a:endParaRPr lang="en-GB"/>
           </a:p>
@@ -3174,7 +3581,7 @@
     </p:spTree>
     <p:extLst>
       <p:ext uri="{BB962C8B-B14F-4D97-AF65-F5344CB8AC3E}">
-        <p14:creationId xmlns:p14="http://schemas.microsoft.com/office/powerpoint/2010/main" val="3068806631"/>
+        <p14:creationId xmlns:p14="http://schemas.microsoft.com/office/powerpoint/2010/main" val="1510383916"/>
       </p:ext>
     </p:extLst>
   </p:cSld>
@@ -3213,8 +3620,8 @@
         </p:nvSpPr>
         <p:spPr>
           <a:xfrm>
-            <a:off x="472381" y="474028"/>
-            <a:ext cx="2211884" cy="1659096"/>
+            <a:off x="472381" y="456036"/>
+            <a:ext cx="2211884" cy="1596126"/>
           </a:xfrm>
         </p:spPr>
         <p:txBody>
@@ -3245,8 +3652,8 @@
         </p:nvSpPr>
         <p:spPr>
           <a:xfrm>
-            <a:off x="2915543" y="1023769"/>
-            <a:ext cx="3471863" cy="5053002"/>
+            <a:off x="2915543" y="984912"/>
+            <a:ext cx="3471863" cy="4861216"/>
           </a:xfrm>
         </p:spPr>
         <p:txBody>
@@ -3310,8 +3717,8 @@
         </p:nvSpPr>
         <p:spPr>
           <a:xfrm>
-            <a:off x="472381" y="2133124"/>
-            <a:ext cx="2211884" cy="3951876"/>
+            <a:off x="472381" y="2052161"/>
+            <a:ext cx="2211884" cy="3801883"/>
           </a:xfrm>
         </p:spPr>
         <p:txBody>
@@ -3380,7 +3787,7 @@
           <a:p>
             <a:fld id="{7DA630C9-F8A3-479A-9A07-CCE6BDA0FBFA}" type="datetimeFigureOut">
               <a:rPr lang="en-GB" smtClean="0"/>
-              <a:t>13/09/2023</a:t>
+              <a:t>13/12/2023</a:t>
             </a:fld>
             <a:endParaRPr lang="en-GB"/>
           </a:p>
@@ -3431,7 +3838,7 @@
     </p:spTree>
     <p:extLst>
       <p:ext uri="{BB962C8B-B14F-4D97-AF65-F5344CB8AC3E}">
-        <p14:creationId xmlns:p14="http://schemas.microsoft.com/office/powerpoint/2010/main" val="3073891014"/>
+        <p14:creationId xmlns:p14="http://schemas.microsoft.com/office/powerpoint/2010/main" val="4190338742"/>
       </p:ext>
     </p:extLst>
   </p:cSld>
@@ -3475,8 +3882,8 @@
         </p:nvSpPr>
         <p:spPr>
           <a:xfrm>
-            <a:off x="471488" y="378565"/>
-            <a:ext cx="5915025" cy="1374351"/>
+            <a:off x="471488" y="364197"/>
+            <a:ext cx="5915025" cy="1322188"/>
           </a:xfrm>
           <a:prstGeom prst="rect">
             <a:avLst/>
@@ -3508,8 +3915,8 @@
         </p:nvSpPr>
         <p:spPr>
           <a:xfrm>
-            <a:off x="471488" y="1892818"/>
-            <a:ext cx="5915025" cy="4511492"/>
+            <a:off x="471488" y="1820976"/>
+            <a:ext cx="5915025" cy="4340259"/>
           </a:xfrm>
           <a:prstGeom prst="rect">
             <a:avLst/>
@@ -3570,8 +3977,8 @@
         </p:nvSpPr>
         <p:spPr>
           <a:xfrm>
-            <a:off x="471488" y="6590301"/>
-            <a:ext cx="1543050" cy="378564"/>
+            <a:off x="471488" y="6340167"/>
+            <a:ext cx="1543050" cy="364195"/>
           </a:xfrm>
           <a:prstGeom prst="rect">
             <a:avLst/>
@@ -3593,7 +4000,7 @@
           <a:p>
             <a:fld id="{7DA630C9-F8A3-479A-9A07-CCE6BDA0FBFA}" type="datetimeFigureOut">
               <a:rPr lang="en-GB" smtClean="0"/>
-              <a:t>13/09/2023</a:t>
+              <a:t>13/12/2023</a:t>
             </a:fld>
             <a:endParaRPr lang="en-GB"/>
           </a:p>
@@ -3611,8 +4018,8 @@
         </p:nvSpPr>
         <p:spPr>
           <a:xfrm>
-            <a:off x="2271713" y="6590301"/>
-            <a:ext cx="2314575" cy="378564"/>
+            <a:off x="2271713" y="6340167"/>
+            <a:ext cx="2314575" cy="364195"/>
           </a:xfrm>
           <a:prstGeom prst="rect">
             <a:avLst/>
@@ -3648,8 +4055,8 @@
         </p:nvSpPr>
         <p:spPr>
           <a:xfrm>
-            <a:off x="4843463" y="6590301"/>
-            <a:ext cx="1543050" cy="378564"/>
+            <a:off x="4843463" y="6340167"/>
+            <a:ext cx="1543050" cy="364195"/>
           </a:xfrm>
           <a:prstGeom prst="rect">
             <a:avLst/>
@@ -3680,23 +4087,23 @@
     </p:spTree>
     <p:extLst>
       <p:ext uri="{BB962C8B-B14F-4D97-AF65-F5344CB8AC3E}">
-        <p14:creationId xmlns:p14="http://schemas.microsoft.com/office/powerpoint/2010/main" val="104243958"/>
+        <p14:creationId xmlns:p14="http://schemas.microsoft.com/office/powerpoint/2010/main" val="3730335780"/>
       </p:ext>
     </p:extLst>
   </p:cSld>
   <p:clrMap bg1="lt1" tx1="dk1" bg2="lt2" tx2="dk2" accent1="accent1" accent2="accent2" accent3="accent3" accent4="accent4" accent5="accent5" accent6="accent6" hlink="hlink" folHlink="folHlink"/>
   <p:sldLayoutIdLst>
-    <p:sldLayoutId id="2147483829" r:id="rId1"/>
-    <p:sldLayoutId id="2147483830" r:id="rId2"/>
-    <p:sldLayoutId id="2147483831" r:id="rId3"/>
-    <p:sldLayoutId id="2147483832" r:id="rId4"/>
-    <p:sldLayoutId id="2147483833" r:id="rId5"/>
-    <p:sldLayoutId id="2147483834" r:id="rId6"/>
-    <p:sldLayoutId id="2147483835" r:id="rId7"/>
-    <p:sldLayoutId id="2147483836" r:id="rId8"/>
-    <p:sldLayoutId id="2147483837" r:id="rId9"/>
-    <p:sldLayoutId id="2147483838" r:id="rId10"/>
-    <p:sldLayoutId id="2147483839" r:id="rId11"/>
+    <p:sldLayoutId id="2147483877" r:id="rId1"/>
+    <p:sldLayoutId id="2147483878" r:id="rId2"/>
+    <p:sldLayoutId id="2147483879" r:id="rId3"/>
+    <p:sldLayoutId id="2147483880" r:id="rId4"/>
+    <p:sldLayoutId id="2147483881" r:id="rId5"/>
+    <p:sldLayoutId id="2147483882" r:id="rId6"/>
+    <p:sldLayoutId id="2147483883" r:id="rId7"/>
+    <p:sldLayoutId id="2147483884" r:id="rId8"/>
+    <p:sldLayoutId id="2147483885" r:id="rId9"/>
+    <p:sldLayoutId id="2147483886" r:id="rId10"/>
+    <p:sldLayoutId id="2147483887" r:id="rId11"/>
   </p:sldLayoutIdLst>
   <p:txStyles>
     <p:titleStyle>
@@ -4000,10 +4407,10 @@
       </p:grpSpPr>
       <p:pic>
         <p:nvPicPr>
-          <p:cNvPr id="87" name="Picture 86" descr="A graph of a graph showing the number of different numbers&#10;&#10;Description automatically generated with medium confidence">
+          <p:cNvPr id="33" name="Picture 32" descr="A graph of a graph showing the number of different numbers&#10;&#10;Description automatically generated with medium confidence">
             <a:extLst>
               <a:ext uri="{FF2B5EF4-FFF2-40B4-BE49-F238E27FC236}">
-                <a16:creationId xmlns:a16="http://schemas.microsoft.com/office/drawing/2014/main" id="{12808E4F-A0CC-1CD9-6BE7-CDA4662210C6}"/>
+                <a16:creationId xmlns:a16="http://schemas.microsoft.com/office/drawing/2014/main" id="{144B217B-CE0B-2BEC-8D53-4A2E020E1AB2}"/>
               </a:ext>
             </a:extLst>
           </p:cNvPr>
@@ -4025,8 +4432,8 @@
         </p:blipFill>
         <p:spPr>
           <a:xfrm>
-            <a:off x="9000" y="10187"/>
-            <a:ext cx="3384000" cy="3498277"/>
+            <a:off x="353518" y="99777"/>
+            <a:ext cx="3132000" cy="3237767"/>
           </a:xfrm>
           <a:prstGeom prst="rect">
             <a:avLst/>
@@ -4035,10 +4442,10 @@
       </p:pic>
       <p:pic>
         <p:nvPicPr>
-          <p:cNvPr id="89" name="Picture 88" descr="A graph of a graph showing the number of different numbers&#10;&#10;Description automatically generated with medium confidence">
+          <p:cNvPr id="34" name="Picture 33" descr="A graph of a graph showing the number of different numbers&#10;&#10;Description automatically generated with medium confidence">
             <a:extLst>
               <a:ext uri="{FF2B5EF4-FFF2-40B4-BE49-F238E27FC236}">
-                <a16:creationId xmlns:a16="http://schemas.microsoft.com/office/drawing/2014/main" id="{C1800E25-D524-C873-6466-6A21BA6B66F7}"/>
+                <a16:creationId xmlns:a16="http://schemas.microsoft.com/office/drawing/2014/main" id="{641BFE02-22A9-3EDD-DED7-1EBCA3ABA035}"/>
               </a:ext>
             </a:extLst>
           </p:cNvPr>
@@ -4060,8 +4467,8 @@
         </p:blipFill>
         <p:spPr>
           <a:xfrm>
-            <a:off x="3457050" y="10187"/>
-            <a:ext cx="3384000" cy="3498277"/>
+            <a:off x="3612683" y="99777"/>
+            <a:ext cx="3132000" cy="3237767"/>
           </a:xfrm>
           <a:prstGeom prst="rect">
             <a:avLst/>
@@ -4070,10 +4477,10 @@
       </p:pic>
       <p:pic>
         <p:nvPicPr>
-          <p:cNvPr id="91" name="Picture 90" descr="A graph of different colored lines&#10;&#10;Description automatically generated">
+          <p:cNvPr id="35" name="Picture 34" descr="A graph of different colored lines&#10;&#10;Description automatically generated">
             <a:extLst>
               <a:ext uri="{FF2B5EF4-FFF2-40B4-BE49-F238E27FC236}">
-                <a16:creationId xmlns:a16="http://schemas.microsoft.com/office/drawing/2014/main" id="{E24B2AE6-2F6E-5C96-14FB-B319013E414E}"/>
+                <a16:creationId xmlns:a16="http://schemas.microsoft.com/office/drawing/2014/main" id="{CB88D001-5149-93FE-EAF3-B74D88C1C902}"/>
               </a:ext>
             </a:extLst>
           </p:cNvPr>
@@ -4095,8 +4502,8 @@
         </p:blipFill>
         <p:spPr>
           <a:xfrm>
-            <a:off x="9000" y="3602831"/>
-            <a:ext cx="3384000" cy="3498277"/>
+            <a:off x="353518" y="3519701"/>
+            <a:ext cx="3132000" cy="3237767"/>
           </a:xfrm>
           <a:prstGeom prst="rect">
             <a:avLst/>
@@ -4105,10 +4512,10 @@
       </p:pic>
       <p:pic>
         <p:nvPicPr>
-          <p:cNvPr id="93" name="Picture 92" descr="A graph of different colored lines&#10;&#10;Description automatically generated">
+          <p:cNvPr id="36" name="Picture 35" descr="A graph of different colored lines&#10;&#10;Description automatically generated">
             <a:extLst>
               <a:ext uri="{FF2B5EF4-FFF2-40B4-BE49-F238E27FC236}">
-                <a16:creationId xmlns:a16="http://schemas.microsoft.com/office/drawing/2014/main" id="{2A3BB1FA-7039-19B9-7CFA-C7424DD91356}"/>
+                <a16:creationId xmlns:a16="http://schemas.microsoft.com/office/drawing/2014/main" id="{B9C13A36-EF37-B47C-DB6C-F8D843034491}"/>
               </a:ext>
             </a:extLst>
           </p:cNvPr>
@@ -4130,8 +4537,8 @@
         </p:blipFill>
         <p:spPr>
           <a:xfrm>
-            <a:off x="3457050" y="3602831"/>
-            <a:ext cx="3384000" cy="3498277"/>
+            <a:off x="3612683" y="3519701"/>
+            <a:ext cx="3132000" cy="3237767"/>
           </a:xfrm>
           <a:prstGeom prst="rect">
             <a:avLst/>
@@ -4140,10 +4547,10 @@
       </p:pic>
       <p:sp>
         <p:nvSpPr>
-          <p:cNvPr id="82" name="TextBox 9">
+          <p:cNvPr id="37" name="TextBox 9">
             <a:extLst>
               <a:ext uri="{FF2B5EF4-FFF2-40B4-BE49-F238E27FC236}">
-                <a16:creationId xmlns:a16="http://schemas.microsoft.com/office/drawing/2014/main" id="{05EBDABA-E63E-DDCA-7A6E-B2A916983831}"/>
+                <a16:creationId xmlns:a16="http://schemas.microsoft.com/office/drawing/2014/main" id="{F9897ED5-2571-F97E-7AE0-66A1587B5521}"/>
               </a:ext>
             </a:extLst>
           </p:cNvPr>
@@ -4152,7 +4559,7 @@
         </p:nvSpPr>
         <p:spPr>
           <a:xfrm>
-            <a:off x="306173" y="2850267"/>
+            <a:off x="630371" y="2696017"/>
             <a:ext cx="252000" cy="276999"/>
           </a:xfrm>
           <a:prstGeom prst="rect">
@@ -4294,10 +4701,10 @@
       </p:sp>
       <p:sp>
         <p:nvSpPr>
-          <p:cNvPr id="83" name="TextBox 9">
+          <p:cNvPr id="38" name="TextBox 9">
             <a:extLst>
               <a:ext uri="{FF2B5EF4-FFF2-40B4-BE49-F238E27FC236}">
-                <a16:creationId xmlns:a16="http://schemas.microsoft.com/office/drawing/2014/main" id="{401B5D69-27B6-A4C4-5E70-01CFE9276114}"/>
+                <a16:creationId xmlns:a16="http://schemas.microsoft.com/office/drawing/2014/main" id="{8749D1A6-589E-299F-24DA-444CE935D70E}"/>
               </a:ext>
             </a:extLst>
           </p:cNvPr>
@@ -4306,7 +4713,7 @@
         </p:nvSpPr>
         <p:spPr>
           <a:xfrm>
-            <a:off x="3760835" y="2850267"/>
+            <a:off x="3896148" y="2696017"/>
             <a:ext cx="252000" cy="276999"/>
           </a:xfrm>
           <a:prstGeom prst="rect">
@@ -4448,10 +4855,10 @@
       </p:sp>
       <p:sp>
         <p:nvSpPr>
-          <p:cNvPr id="84" name="TextBox 9">
+          <p:cNvPr id="39" name="TextBox 9">
             <a:extLst>
               <a:ext uri="{FF2B5EF4-FFF2-40B4-BE49-F238E27FC236}">
-                <a16:creationId xmlns:a16="http://schemas.microsoft.com/office/drawing/2014/main" id="{6A4CBD19-AD51-3518-DA4C-90CCA09FDBD6}"/>
+                <a16:creationId xmlns:a16="http://schemas.microsoft.com/office/drawing/2014/main" id="{159AE6D1-FE61-9A8F-EB19-DB2AE4B8F7BB}"/>
               </a:ext>
             </a:extLst>
           </p:cNvPr>
@@ -4460,7 +4867,7 @@
         </p:nvSpPr>
         <p:spPr>
           <a:xfrm>
-            <a:off x="306173" y="6446406"/>
+            <a:off x="630371" y="6119436"/>
             <a:ext cx="252000" cy="276999"/>
           </a:xfrm>
           <a:prstGeom prst="rect">
@@ -4602,10 +5009,10 @@
       </p:sp>
       <p:sp>
         <p:nvSpPr>
-          <p:cNvPr id="85" name="TextBox 9">
+          <p:cNvPr id="40" name="TextBox 9">
             <a:extLst>
               <a:ext uri="{FF2B5EF4-FFF2-40B4-BE49-F238E27FC236}">
-                <a16:creationId xmlns:a16="http://schemas.microsoft.com/office/drawing/2014/main" id="{AE743FFB-11E9-765E-E879-C0D6F59F0A1B}"/>
+                <a16:creationId xmlns:a16="http://schemas.microsoft.com/office/drawing/2014/main" id="{45CC2908-031B-92BE-0853-D8F2BE1DE3E8}"/>
               </a:ext>
             </a:extLst>
           </p:cNvPr>
@@ -4614,7 +5021,7 @@
         </p:nvSpPr>
         <p:spPr>
           <a:xfrm>
-            <a:off x="3760835" y="6446406"/>
+            <a:off x="3896148" y="6119436"/>
             <a:ext cx="252000" cy="276999"/>
           </a:xfrm>
           <a:prstGeom prst="rect">
@@ -4749,6 +5156,94 @@
                   <a:lumMod val="65000"/>
                   <a:lumOff val="35000"/>
                 </a:schemeClr>
+              </a:solidFill>
+            </a:endParaRPr>
+          </a:p>
+        </p:txBody>
+      </p:sp>
+      <p:cxnSp>
+        <p:nvCxnSpPr>
+          <p:cNvPr id="41" name="Straight Arrow Connector 40">
+            <a:extLst>
+              <a:ext uri="{FF2B5EF4-FFF2-40B4-BE49-F238E27FC236}">
+                <a16:creationId xmlns:a16="http://schemas.microsoft.com/office/drawing/2014/main" id="{B4C043E9-3489-91AF-F4DB-FD0645AEFF00}"/>
+              </a:ext>
+            </a:extLst>
+          </p:cNvPr>
+          <p:cNvCxnSpPr>
+            <a:cxnSpLocks/>
+          </p:cNvCxnSpPr>
+          <p:nvPr/>
+        </p:nvCxnSpPr>
+        <p:spPr>
+          <a:xfrm rot="10800000">
+            <a:off x="261777" y="2767227"/>
+            <a:ext cx="0" cy="1440000"/>
+          </a:xfrm>
+          <a:prstGeom prst="straightConnector1">
+            <a:avLst/>
+          </a:prstGeom>
+          <a:ln w="12700">
+            <a:solidFill>
+              <a:srgbClr val="FF0000"/>
+            </a:solidFill>
+            <a:tailEnd type="triangle"/>
+          </a:ln>
+        </p:spPr>
+        <p:style>
+          <a:lnRef idx="1">
+            <a:schemeClr val="accent1"/>
+          </a:lnRef>
+          <a:fillRef idx="0">
+            <a:schemeClr val="accent1"/>
+          </a:fillRef>
+          <a:effectRef idx="0">
+            <a:schemeClr val="accent1"/>
+          </a:effectRef>
+          <a:fontRef idx="minor">
+            <a:schemeClr val="tx1"/>
+          </a:fontRef>
+        </p:style>
+      </p:cxnSp>
+      <p:sp>
+        <p:nvSpPr>
+          <p:cNvPr id="42" name="TextBox 41">
+            <a:extLst>
+              <a:ext uri="{FF2B5EF4-FFF2-40B4-BE49-F238E27FC236}">
+                <a16:creationId xmlns:a16="http://schemas.microsoft.com/office/drawing/2014/main" id="{29B3FAC5-7BBD-C3BB-6D6C-F39F2E256B03}"/>
+              </a:ext>
+            </a:extLst>
+          </p:cNvPr>
+          <p:cNvSpPr txBox="1"/>
+          <p:nvPr/>
+        </p:nvSpPr>
+        <p:spPr>
+          <a:xfrm>
+            <a:off x="-5227" y="2178102"/>
+            <a:ext cx="307777" cy="1907101"/>
+          </a:xfrm>
+          <a:prstGeom prst="rect">
+            <a:avLst/>
+          </a:prstGeom>
+          <a:noFill/>
+        </p:spPr>
+        <p:txBody>
+          <a:bodyPr vert="vert270" wrap="square" rtlCol="0">
+            <a:spAutoFit/>
+          </a:bodyPr>
+          <a:lstStyle/>
+          <a:p>
+            <a:r>
+              <a:rPr lang="en-US" sz="800" b="1" dirty="0">
+                <a:solidFill>
+                  <a:srgbClr val="FF0000"/>
+                </a:solidFill>
+              </a:rPr>
+              <a:t>Orientation of better scores</a:t>
+            </a:r>
+            <a:endParaRPr lang="en-GB" sz="800" b="1" dirty="0">
+              <a:solidFill>
+                <a:srgbClr val="FF0000"/>
               </a:solidFill>
             </a:endParaRPr>
           </a:p>

</xml_diff>